<commit_message>
final version of the ppt
</commit_message>
<xml_diff>
--- a/CheckpointIII/CIII_G15.pptx
+++ b/CheckpointIII/CIII_G15.pptx
@@ -5,21 +5,20 @@
     <p:sldMasterId id="2147483648" r:id="rId1"/>
   </p:sldMasterIdLst>
   <p:notesMasterIdLst>
-    <p:notesMasterId r:id="rId11"/>
+    <p:notesMasterId r:id="rId10"/>
   </p:notesMasterIdLst>
   <p:handoutMasterIdLst>
-    <p:handoutMasterId r:id="rId12"/>
+    <p:handoutMasterId r:id="rId11"/>
   </p:handoutMasterIdLst>
   <p:sldIdLst>
     <p:sldId id="256" r:id="rId2"/>
     <p:sldId id="1111" r:id="rId3"/>
     <p:sldId id="1112" r:id="rId4"/>
     <p:sldId id="257" r:id="rId5"/>
-    <p:sldId id="1096" r:id="rId6"/>
-    <p:sldId id="1109" r:id="rId7"/>
-    <p:sldId id="1097" r:id="rId8"/>
-    <p:sldId id="1098" r:id="rId9"/>
-    <p:sldId id="1121" r:id="rId10"/>
+    <p:sldId id="1109" r:id="rId6"/>
+    <p:sldId id="1097" r:id="rId7"/>
+    <p:sldId id="1098" r:id="rId8"/>
+    <p:sldId id="1113" r:id="rId9"/>
   </p:sldIdLst>
   <p:sldSz cx="9144000" cy="6858000" type="screen4x3"/>
   <p:notesSz cx="6858000" cy="9144000"/>
@@ -219,7 +218,7 @@
           <a:p>
             <a:fld id="{745C36E7-9E00-462E-80A3-32F2BE615C7A}" type="datetimeFigureOut">
               <a:rPr lang="en-US" smtClean="0"/>
-              <a:t>29-Oct-19</a:t>
+              <a:t>10/29/19</a:t>
             </a:fld>
             <a:endParaRPr lang="en-US"/>
           </a:p>
@@ -385,7 +384,7 @@
             <a:fld id="{01F3E309-ED8D-4193-99AF-E5EA90965E98}" type="datetimeFigureOut">
               <a:rPr lang="en-US" smtClean="0"/>
               <a:pPr/>
-              <a:t>29-Oct-19</a:t>
+              <a:t>10/29/19</a:t>
             </a:fld>
             <a:endParaRPr lang="en-US"/>
           </a:p>
@@ -891,7 +890,7 @@
             <a:fld id="{F535F173-C1DD-4975-94BF-5B9ED67F7674}" type="slidenum">
               <a:rPr lang="en-US" smtClean="0"/>
               <a:pPr/>
-              <a:t>6</a:t>
+              <a:t>7</a:t>
             </a:fld>
             <a:endParaRPr lang="en-US"/>
           </a:p>
@@ -985,7 +984,7 @@
     </p:spTree>
     <p:extLst>
       <p:ext uri="{BB962C8B-B14F-4D97-AF65-F5344CB8AC3E}">
-        <p14:creationId xmlns:p14="http://schemas.microsoft.com/office/powerpoint/2010/main" val="1355792998"/>
+        <p14:creationId xmlns:p14="http://schemas.microsoft.com/office/powerpoint/2010/main" val="226961171"/>
       </p:ext>
     </p:extLst>
   </p:cSld>
@@ -1487,7 +1486,7 @@
             <a:fld id="{F3CC9924-33BC-4796-B0F9-D37DB5D899BF}" type="datetimeFigureOut">
               <a:rPr lang="pt-PT" smtClean="0"/>
               <a:pPr/>
-              <a:t>29/10/2019</a:t>
+              <a:t>29/10/19</a:t>
             </a:fld>
             <a:endParaRPr lang="pt-PT"/>
           </a:p>
@@ -3264,7 +3263,7 @@
                   <a:schemeClr val="bg2"/>
                 </a:solidFill>
               </a:rPr>
-              <a:t>G15-A</a:t>
+              <a:t>GX-A/T</a:t>
             </a:r>
           </a:p>
         </p:txBody>
@@ -3280,12 +3279,14 @@
         <p:spPr>
           <a:xfrm>
             <a:off x="1979712" y="4571984"/>
-            <a:ext cx="3456384" cy="2286016"/>
+            <a:ext cx="2285984" cy="2286016"/>
           </a:xfrm>
           <a:prstGeom prst="rect">
             <a:avLst/>
           </a:prstGeom>
-          <a:noFill/>
+          <a:solidFill>
+            <a:schemeClr val="bg1"/>
+          </a:solidFill>
           <a:ln>
             <a:noFill/>
           </a:ln>
@@ -3432,36 +3433,83 @@
             </a:lvl9pPr>
           </a:lstStyle>
           <a:p>
-            <a:pPr algn="l"/>
+            <a:r>
+              <a:rPr lang="pt-PT" sz="2400" b="0" dirty="0" err="1">
+                <a:solidFill>
+                  <a:schemeClr val="bg2"/>
+                </a:solidFill>
+              </a:rPr>
+              <a:t>Number</a:t>
+            </a:r>
             <a:r>
               <a:rPr lang="pt-PT" sz="2400" b="0" dirty="0">
                 <a:solidFill>
                   <a:schemeClr val="bg2"/>
                 </a:solidFill>
               </a:rPr>
-              <a:t>88647 – Yasser  Zacarias</a:t>
-            </a:r>
-          </a:p>
-          <a:p>
-            <a:pPr algn="l"/>
+              <a:t> – </a:t>
+            </a:r>
+            <a:r>
+              <a:rPr lang="pt-PT" sz="2400" b="0" dirty="0" err="1">
+                <a:solidFill>
+                  <a:schemeClr val="bg2"/>
+                </a:solidFill>
+              </a:rPr>
+              <a:t>Name</a:t>
+            </a:r>
+            <a:endParaRPr lang="pt-PT" sz="2400" b="0" dirty="0">
+              <a:solidFill>
+                <a:schemeClr val="bg2"/>
+              </a:solidFill>
+            </a:endParaRPr>
+          </a:p>
+          <a:p>
+            <a:r>
+              <a:rPr lang="pt-PT" sz="2400" b="0" dirty="0" err="1">
+                <a:solidFill>
+                  <a:schemeClr val="bg2"/>
+                </a:solidFill>
+              </a:rPr>
+              <a:t>Number</a:t>
+            </a:r>
             <a:r>
               <a:rPr lang="pt-PT" sz="2400" b="0" dirty="0">
                 <a:solidFill>
                   <a:schemeClr val="bg2"/>
                 </a:solidFill>
               </a:rPr>
-              <a:t>86473 – Margarida Morais</a:t>
-            </a:r>
-          </a:p>
-          <a:p>
-            <a:pPr algn="l"/>
+              <a:t> – </a:t>
+            </a:r>
+            <a:r>
+              <a:rPr lang="pt-PT" sz="2400" b="0" dirty="0" err="1">
+                <a:solidFill>
+                  <a:schemeClr val="bg2"/>
+                </a:solidFill>
+              </a:rPr>
+              <a:t>Name</a:t>
+            </a:r>
+            <a:endParaRPr lang="pt-PT" sz="2400" b="0" dirty="0">
+              <a:solidFill>
+                <a:schemeClr val="bg2"/>
+              </a:solidFill>
+            </a:endParaRPr>
+          </a:p>
+          <a:p>
+            <a:r>
+              <a:rPr lang="pt-PT" sz="2400" b="0" dirty="0" err="1">
+                <a:solidFill>
+                  <a:schemeClr val="bg2"/>
+                </a:solidFill>
+              </a:rPr>
+              <a:t>Number</a:t>
+            </a:r>
             <a:r>
               <a:rPr lang="pt-PT" sz="2400" b="0" dirty="0">
                 <a:solidFill>
                   <a:schemeClr val="bg2"/>
                 </a:solidFill>
               </a:rPr>
-              <a:t>79457 – Maxwell </a:t>
+              <a:t> – </a:t>
             </a:r>
             <a:r>
               <a:rPr lang="pt-PT" sz="2400" b="0" dirty="0" err="1">
@@ -3469,16 +3517,13 @@
                   <a:schemeClr val="bg2"/>
                 </a:solidFill>
               </a:rPr>
-              <a:t>Junior</a:t>
-            </a:r>
-            <a:r>
-              <a:rPr lang="pt-PT" sz="2400" b="0" dirty="0">
-                <a:solidFill>
-                  <a:schemeClr val="bg2"/>
-                </a:solidFill>
-              </a:rPr>
-              <a:t> </a:t>
-            </a:r>
+              <a:t>Name</a:t>
+            </a:r>
+            <a:endParaRPr lang="pt-PT" sz="2400" b="0" dirty="0">
+              <a:solidFill>
+                <a:schemeClr val="bg2"/>
+              </a:solidFill>
+            </a:endParaRPr>
           </a:p>
         </p:txBody>
       </p:sp>
@@ -3637,48 +3682,41 @@
           </a:p>
         </p:txBody>
       </p:sp>
-      <p:sp>
-        <p:nvSpPr>
-          <p:cNvPr id="3" name="Content Placeholder 2"/>
-          <p:cNvSpPr>
-            <a:spLocks noGrp="1"/>
-          </p:cNvSpPr>
+      <p:pic>
+        <p:nvPicPr>
+          <p:cNvPr id="5" name="Marcador de Posição de Conteúdo 4" descr="Uma imagem com texto, mapa&#10;&#10;Descrição gerada automaticamente">
+            <a:extLst>
+              <a:ext uri="{FF2B5EF4-FFF2-40B4-BE49-F238E27FC236}">
+                <a16:creationId xmlns:a16="http://schemas.microsoft.com/office/drawing/2014/main" id="{23B1B350-C590-F848-B7C6-E2232DFEFE9B}"/>
+              </a:ext>
+            </a:extLst>
+          </p:cNvPr>
+          <p:cNvPicPr>
+            <a:picLocks noGrp="1" noChangeAspect="1"/>
+          </p:cNvPicPr>
           <p:nvPr>
             <p:ph idx="1"/>
           </p:nvPr>
-        </p:nvSpPr>
-        <p:spPr/>
-        <p:txBody>
-          <a:bodyPr>
-            <a:noAutofit/>
-          </a:bodyPr>
-          <a:lstStyle/>
-          <a:p>
-            <a:r>
-              <a:rPr lang="en-US" sz="4000" dirty="0"/>
-              <a:t>Overview of your screen (including the several idioms you are going to use, highlighting how the work together, etc.)</a:t>
-            </a:r>
-          </a:p>
-          <a:p>
-            <a:endParaRPr lang="en-US" sz="4000" dirty="0"/>
-          </a:p>
-          <a:p>
-            <a:r>
-              <a:rPr lang="en-US" sz="4000" i="1"/>
-              <a:t>(This </a:t>
-            </a:r>
-            <a:r>
-              <a:rPr lang="en-US" sz="4000" i="1" dirty="0"/>
-              <a:t>should be a visual sketch, not just </a:t>
-            </a:r>
-            <a:r>
-              <a:rPr lang="en-US" sz="4000" i="1"/>
-              <a:t>“talk”!)</a:t>
-            </a:r>
-            <a:endParaRPr lang="en-US" sz="4000" i="1" dirty="0"/>
-          </a:p>
-        </p:txBody>
-      </p:sp>
+        </p:nvPicPr>
+        <p:blipFill>
+          <a:blip r:embed="rId3">
+            <a:extLst>
+              <a:ext uri="{28A0092B-C50C-407E-A947-70E740481C1C}">
+                <a14:useLocalDpi xmlns:a14="http://schemas.microsoft.com/office/drawing/2010/main" val="0"/>
+              </a:ext>
+            </a:extLst>
+          </a:blip>
+          <a:stretch>
+            <a:fillRect/>
+          </a:stretch>
+        </p:blipFill>
+        <p:spPr>
+          <a:xfrm>
+            <a:off x="107504" y="929916"/>
+            <a:ext cx="8640960" cy="5963907"/>
+          </a:xfrm>
+        </p:spPr>
+      </p:pic>
     </p:spTree>
     <p:extLst>
       <p:ext uri="{BB962C8B-B14F-4D97-AF65-F5344CB8AC3E}">
@@ -3838,40 +3876,663 @@
           </a:p>
         </p:txBody>
       </p:sp>
-      <p:sp>
-        <p:nvSpPr>
-          <p:cNvPr id="3" name="Content Placeholder 2"/>
-          <p:cNvSpPr>
-            <a:spLocks noGrp="1"/>
-          </p:cNvSpPr>
+      <p:graphicFrame>
+        <p:nvGraphicFramePr>
+          <p:cNvPr id="8" name="Marcador de Posição de Conteúdo 7">
+            <a:extLst>
+              <a:ext uri="{FF2B5EF4-FFF2-40B4-BE49-F238E27FC236}">
+                <a16:creationId xmlns:a16="http://schemas.microsoft.com/office/drawing/2014/main" id="{A405AC9C-52F2-304B-99D6-0F856B9283BF}"/>
+              </a:ext>
+            </a:extLst>
+          </p:cNvPr>
+          <p:cNvGraphicFramePr>
+            <a:graphicFrameLocks noGrp="1"/>
+          </p:cNvGraphicFramePr>
           <p:nvPr>
             <p:ph idx="1"/>
-          </p:nvPr>
-        </p:nvSpPr>
-        <p:spPr/>
-        <p:txBody>
-          <a:bodyPr>
-            <a:noAutofit/>
-          </a:bodyPr>
-          <a:lstStyle/>
-          <a:p>
-            <a:r>
-              <a:rPr lang="en-US" sz="4000" dirty="0"/>
-              <a:t>Item1 | Type:</a:t>
-            </a:r>
-          </a:p>
-          <a:p>
-            <a:r>
-              <a:rPr lang="en-US" sz="4000" dirty="0"/>
-              <a:t>Visual Encoding:</a:t>
-            </a:r>
-          </a:p>
-        </p:txBody>
-      </p:sp>
+            <p:extLst>
+              <p:ext uri="{D42A27DB-BD31-4B8C-83A1-F6EECF244321}">
+                <p14:modId xmlns:p14="http://schemas.microsoft.com/office/powerpoint/2010/main" val="365029620"/>
+              </p:ext>
+            </p:extLst>
+          </p:nvPr>
+        </p:nvGraphicFramePr>
+        <p:xfrm>
+          <a:off x="245417" y="1345836"/>
+          <a:ext cx="8184933" cy="5327318"/>
+        </p:xfrm>
+        <a:graphic>
+          <a:graphicData uri="http://schemas.openxmlformats.org/drawingml/2006/table">
+            <a:tbl>
+              <a:tblPr firstRow="1" firstCol="1" bandRow="1">
+                <a:tableStyleId>{5C22544A-7EE6-4342-B048-85BDC9FD1C3A}</a:tableStyleId>
+              </a:tblPr>
+              <a:tblGrid>
+                <a:gridCol w="3648430">
+                  <a:extLst>
+                    <a:ext uri="{9D8B030D-6E8A-4147-A177-3AD203B41FA5}">
+                      <a16:colId xmlns:a16="http://schemas.microsoft.com/office/drawing/2014/main" val="784312473"/>
+                    </a:ext>
+                  </a:extLst>
+                </a:gridCol>
+                <a:gridCol w="1872208">
+                  <a:extLst>
+                    <a:ext uri="{9D8B030D-6E8A-4147-A177-3AD203B41FA5}">
+                      <a16:colId xmlns:a16="http://schemas.microsoft.com/office/drawing/2014/main" val="1767727878"/>
+                    </a:ext>
+                  </a:extLst>
+                </a:gridCol>
+                <a:gridCol w="2664295">
+                  <a:extLst>
+                    <a:ext uri="{9D8B030D-6E8A-4147-A177-3AD203B41FA5}">
+                      <a16:colId xmlns:a16="http://schemas.microsoft.com/office/drawing/2014/main" val="530241069"/>
+                    </a:ext>
+                  </a:extLst>
+                </a:gridCol>
+              </a:tblGrid>
+              <a:tr h="673528">
+                <a:tc>
+                  <a:txBody>
+                    <a:bodyPr/>
+                    <a:lstStyle/>
+                    <a:p>
+                      <a:pPr algn="ctr">
+                        <a:spcAft>
+                          <a:spcPts val="0"/>
+                        </a:spcAft>
+                      </a:pPr>
+                      <a:r>
+                        <a:rPr lang="pt-PT" sz="2400" dirty="0" err="1">
+                          <a:effectLst/>
+                        </a:rPr>
+                        <a:t>Variable</a:t>
+                      </a:r>
+                      <a:endParaRPr lang="pt-PT" sz="2400" dirty="0">
+                        <a:effectLst/>
+                        <a:latin typeface="Cambria" panose="02040503050406030204" pitchFamily="18" charset="0"/>
+                        <a:ea typeface="Cambria" panose="02040503050406030204" pitchFamily="18" charset="0"/>
+                        <a:cs typeface="Times New Roman" panose="02020603050405020304" pitchFamily="18" charset="0"/>
+                      </a:endParaRPr>
+                    </a:p>
+                  </a:txBody>
+                  <a:tcPr marL="101174" marR="101174" marT="0" marB="0"/>
+                </a:tc>
+                <a:tc>
+                  <a:txBody>
+                    <a:bodyPr/>
+                    <a:lstStyle/>
+                    <a:p>
+                      <a:pPr algn="ctr">
+                        <a:spcAft>
+                          <a:spcPts val="0"/>
+                        </a:spcAft>
+                      </a:pPr>
+                      <a:r>
+                        <a:rPr lang="en-GB" sz="2400" dirty="0">
+                          <a:effectLst/>
+                        </a:rPr>
+                        <a:t>Data Type</a:t>
+                      </a:r>
+                      <a:endParaRPr lang="pt-PT" sz="2400" dirty="0">
+                        <a:effectLst/>
+                        <a:latin typeface="Cambria" panose="02040503050406030204" pitchFamily="18" charset="0"/>
+                        <a:ea typeface="Cambria" panose="02040503050406030204" pitchFamily="18" charset="0"/>
+                        <a:cs typeface="Times New Roman" panose="02020603050405020304" pitchFamily="18" charset="0"/>
+                      </a:endParaRPr>
+                    </a:p>
+                  </a:txBody>
+                  <a:tcPr marL="101174" marR="101174" marT="0" marB="0"/>
+                </a:tc>
+                <a:tc>
+                  <a:txBody>
+                    <a:bodyPr/>
+                    <a:lstStyle/>
+                    <a:p>
+                      <a:pPr algn="ctr">
+                        <a:spcAft>
+                          <a:spcPts val="0"/>
+                        </a:spcAft>
+                      </a:pPr>
+                      <a:r>
+                        <a:rPr lang="en-GB" sz="2400" dirty="0">
+                          <a:effectLst/>
+                        </a:rPr>
+                        <a:t>Visual Encoding</a:t>
+                      </a:r>
+                      <a:endParaRPr lang="pt-PT" sz="2400" dirty="0">
+                        <a:effectLst/>
+                        <a:latin typeface="Cambria" panose="02040503050406030204" pitchFamily="18" charset="0"/>
+                        <a:ea typeface="Cambria" panose="02040503050406030204" pitchFamily="18" charset="0"/>
+                        <a:cs typeface="Times New Roman" panose="02020603050405020304" pitchFamily="18" charset="0"/>
+                      </a:endParaRPr>
+                    </a:p>
+                  </a:txBody>
+                  <a:tcPr marL="101174" marR="101174" marT="0" marB="0"/>
+                </a:tc>
+                <a:extLst>
+                  <a:ext uri="{0D108BD9-81ED-4DB2-BD59-A6C34878D82A}">
+                    <a16:rowId xmlns:a16="http://schemas.microsoft.com/office/drawing/2014/main" val="3146553862"/>
+                  </a:ext>
+                </a:extLst>
+              </a:tr>
+              <a:tr h="733446">
+                <a:tc>
+                  <a:txBody>
+                    <a:bodyPr/>
+                    <a:lstStyle/>
+                    <a:p>
+                      <a:pPr algn="just">
+                        <a:spcAft>
+                          <a:spcPts val="0"/>
+                        </a:spcAft>
+                      </a:pPr>
+                      <a:r>
+                        <a:rPr lang="pt-PT" sz="2400" dirty="0" err="1">
+                          <a:effectLst/>
+                        </a:rPr>
+                        <a:t>avg_year_income</a:t>
+                      </a:r>
+                      <a:endParaRPr lang="pt-PT" sz="2400" dirty="0">
+                        <a:effectLst/>
+                        <a:latin typeface="Cambria" panose="02040503050406030204" pitchFamily="18" charset="0"/>
+                        <a:ea typeface="Cambria" panose="02040503050406030204" pitchFamily="18" charset="0"/>
+                        <a:cs typeface="Times New Roman" panose="02020603050405020304" pitchFamily="18" charset="0"/>
+                      </a:endParaRPr>
+                    </a:p>
+                  </a:txBody>
+                  <a:tcPr marL="101174" marR="101174" marT="0" marB="0"/>
+                </a:tc>
+                <a:tc>
+                  <a:txBody>
+                    <a:bodyPr/>
+                    <a:lstStyle/>
+                    <a:p>
+                      <a:pPr algn="just">
+                        <a:spcAft>
+                          <a:spcPts val="0"/>
+                        </a:spcAft>
+                      </a:pPr>
+                      <a:r>
+                        <a:rPr lang="en-GB" sz="2400" dirty="0">
+                          <a:effectLst/>
+                        </a:rPr>
+                        <a:t>Quantitative</a:t>
+                      </a:r>
+                      <a:endParaRPr lang="pt-PT" sz="2400" dirty="0">
+                        <a:effectLst/>
+                        <a:latin typeface="Cambria" panose="02040503050406030204" pitchFamily="18" charset="0"/>
+                        <a:ea typeface="Cambria" panose="02040503050406030204" pitchFamily="18" charset="0"/>
+                        <a:cs typeface="Times New Roman" panose="02020603050405020304" pitchFamily="18" charset="0"/>
+                      </a:endParaRPr>
+                    </a:p>
+                  </a:txBody>
+                  <a:tcPr marL="101174" marR="101174" marT="0" marB="0"/>
+                </a:tc>
+                <a:tc>
+                  <a:txBody>
+                    <a:bodyPr/>
+                    <a:lstStyle/>
+                    <a:p>
+                      <a:pPr algn="just">
+                        <a:spcAft>
+                          <a:spcPts val="0"/>
+                        </a:spcAft>
+                      </a:pPr>
+                      <a:r>
+                        <a:rPr lang="en-GB" sz="2400" dirty="0">
+                          <a:effectLst/>
+                        </a:rPr>
+                        <a:t>Heatmap, scatter plot, colour scale</a:t>
+                      </a:r>
+                      <a:endParaRPr lang="pt-PT" sz="2400" dirty="0">
+                        <a:effectLst/>
+                        <a:latin typeface="Cambria" panose="02040503050406030204" pitchFamily="18" charset="0"/>
+                        <a:ea typeface="Cambria" panose="02040503050406030204" pitchFamily="18" charset="0"/>
+                        <a:cs typeface="Times New Roman" panose="02020603050405020304" pitchFamily="18" charset="0"/>
+                      </a:endParaRPr>
+                    </a:p>
+                  </a:txBody>
+                  <a:tcPr marL="101174" marR="101174" marT="0" marB="0"/>
+                </a:tc>
+                <a:extLst>
+                  <a:ext uri="{0D108BD9-81ED-4DB2-BD59-A6C34878D82A}">
+                    <a16:rowId xmlns:a16="http://schemas.microsoft.com/office/drawing/2014/main" val="242814964"/>
+                  </a:ext>
+                </a:extLst>
+              </a:tr>
+              <a:tr h="733446">
+                <a:tc>
+                  <a:txBody>
+                    <a:bodyPr/>
+                    <a:lstStyle/>
+                    <a:p>
+                      <a:pPr algn="just">
+                        <a:spcAft>
+                          <a:spcPts val="0"/>
+                        </a:spcAft>
+                      </a:pPr>
+                      <a:r>
+                        <a:rPr lang="en-GB" sz="2400" dirty="0" err="1">
+                          <a:effectLst/>
+                        </a:rPr>
+                        <a:t>percentage_total_expend</a:t>
+                      </a:r>
+                      <a:endParaRPr lang="pt-PT" sz="2400" dirty="0">
+                        <a:effectLst/>
+                        <a:latin typeface="Cambria" panose="02040503050406030204" pitchFamily="18" charset="0"/>
+                        <a:ea typeface="Cambria" panose="02040503050406030204" pitchFamily="18" charset="0"/>
+                        <a:cs typeface="Times New Roman" panose="02020603050405020304" pitchFamily="18" charset="0"/>
+                      </a:endParaRPr>
+                    </a:p>
+                  </a:txBody>
+                  <a:tcPr marL="101174" marR="101174" marT="0" marB="0"/>
+                </a:tc>
+                <a:tc>
+                  <a:txBody>
+                    <a:bodyPr/>
+                    <a:lstStyle/>
+                    <a:p>
+                      <a:pPr algn="just">
+                        <a:spcAft>
+                          <a:spcPts val="0"/>
+                        </a:spcAft>
+                      </a:pPr>
+                      <a:r>
+                        <a:rPr lang="en-GB" sz="2400" dirty="0">
+                          <a:effectLst/>
+                        </a:rPr>
+                        <a:t>Quantitative</a:t>
+                      </a:r>
+                      <a:endParaRPr lang="pt-PT" sz="2400" dirty="0">
+                        <a:effectLst/>
+                        <a:latin typeface="Cambria" panose="02040503050406030204" pitchFamily="18" charset="0"/>
+                        <a:ea typeface="Cambria" panose="02040503050406030204" pitchFamily="18" charset="0"/>
+                        <a:cs typeface="Times New Roman" panose="02020603050405020304" pitchFamily="18" charset="0"/>
+                      </a:endParaRPr>
+                    </a:p>
+                  </a:txBody>
+                  <a:tcPr marL="101174" marR="101174" marT="0" marB="0"/>
+                </a:tc>
+                <a:tc>
+                  <a:txBody>
+                    <a:bodyPr/>
+                    <a:lstStyle/>
+                    <a:p>
+                      <a:pPr algn="just">
+                        <a:spcAft>
+                          <a:spcPts val="0"/>
+                        </a:spcAft>
+                      </a:pPr>
+                      <a:r>
+                        <a:rPr lang="en-GB" sz="2400" dirty="0">
+                          <a:effectLst/>
+                        </a:rPr>
+                        <a:t>Parallel Coordinates Plot, vertical</a:t>
+                      </a:r>
+                      <a:endParaRPr lang="pt-PT" sz="2400" dirty="0">
+                        <a:effectLst/>
+                        <a:latin typeface="Cambria" panose="02040503050406030204" pitchFamily="18" charset="0"/>
+                        <a:ea typeface="Cambria" panose="02040503050406030204" pitchFamily="18" charset="0"/>
+                        <a:cs typeface="Times New Roman" panose="02020603050405020304" pitchFamily="18" charset="0"/>
+                      </a:endParaRPr>
+                    </a:p>
+                  </a:txBody>
+                  <a:tcPr marL="101174" marR="101174" marT="0" marB="0"/>
+                </a:tc>
+                <a:extLst>
+                  <a:ext uri="{0D108BD9-81ED-4DB2-BD59-A6C34878D82A}">
+                    <a16:rowId xmlns:a16="http://schemas.microsoft.com/office/drawing/2014/main" val="3696451334"/>
+                  </a:ext>
+                </a:extLst>
+              </a:tr>
+              <a:tr h="723254">
+                <a:tc>
+                  <a:txBody>
+                    <a:bodyPr/>
+                    <a:lstStyle/>
+                    <a:p>
+                      <a:pPr algn="just">
+                        <a:spcAft>
+                          <a:spcPts val="0"/>
+                        </a:spcAft>
+                      </a:pPr>
+                      <a:r>
+                        <a:rPr lang="en-GB" sz="2400" dirty="0" err="1">
+                          <a:effectLst/>
+                        </a:rPr>
+                        <a:t>avg_reading_minutes</a:t>
+                      </a:r>
+                      <a:endParaRPr lang="pt-PT" sz="2400" dirty="0">
+                        <a:effectLst/>
+                        <a:latin typeface="Cambria" panose="02040503050406030204" pitchFamily="18" charset="0"/>
+                        <a:ea typeface="Cambria" panose="02040503050406030204" pitchFamily="18" charset="0"/>
+                        <a:cs typeface="Times New Roman" panose="02020603050405020304" pitchFamily="18" charset="0"/>
+                      </a:endParaRPr>
+                    </a:p>
+                  </a:txBody>
+                  <a:tcPr marL="101174" marR="101174" marT="0" marB="0"/>
+                </a:tc>
+                <a:tc>
+                  <a:txBody>
+                    <a:bodyPr/>
+                    <a:lstStyle/>
+                    <a:p>
+                      <a:pPr algn="just">
+                        <a:spcAft>
+                          <a:spcPts val="0"/>
+                        </a:spcAft>
+                      </a:pPr>
+                      <a:r>
+                        <a:rPr lang="en-GB" sz="2400" dirty="0">
+                          <a:effectLst/>
+                        </a:rPr>
+                        <a:t>Quantitative</a:t>
+                      </a:r>
+                      <a:endParaRPr lang="pt-PT" sz="2400" dirty="0">
+                        <a:effectLst/>
+                        <a:latin typeface="Cambria" panose="02040503050406030204" pitchFamily="18" charset="0"/>
+                        <a:ea typeface="Cambria" panose="02040503050406030204" pitchFamily="18" charset="0"/>
+                        <a:cs typeface="Times New Roman" panose="02020603050405020304" pitchFamily="18" charset="0"/>
+                      </a:endParaRPr>
+                    </a:p>
+                  </a:txBody>
+                  <a:tcPr marL="101174" marR="101174" marT="0" marB="0"/>
+                </a:tc>
+                <a:tc>
+                  <a:txBody>
+                    <a:bodyPr/>
+                    <a:lstStyle/>
+                    <a:p>
+                      <a:pPr algn="just">
+                        <a:spcAft>
+                          <a:spcPts val="0"/>
+                        </a:spcAft>
+                      </a:pPr>
+                      <a:r>
+                        <a:rPr lang="en-GB" sz="2400" dirty="0">
+                          <a:effectLst/>
+                        </a:rPr>
+                        <a:t>Map, colour scale</a:t>
+                      </a:r>
+                      <a:endParaRPr lang="pt-PT" sz="2400" dirty="0">
+                        <a:effectLst/>
+                        <a:latin typeface="Cambria" panose="02040503050406030204" pitchFamily="18" charset="0"/>
+                        <a:ea typeface="Cambria" panose="02040503050406030204" pitchFamily="18" charset="0"/>
+                        <a:cs typeface="Times New Roman" panose="02020603050405020304" pitchFamily="18" charset="0"/>
+                      </a:endParaRPr>
+                    </a:p>
+                  </a:txBody>
+                  <a:tcPr marL="101174" marR="101174" marT="0" marB="0"/>
+                </a:tc>
+                <a:extLst>
+                  <a:ext uri="{0D108BD9-81ED-4DB2-BD59-A6C34878D82A}">
+                    <a16:rowId xmlns:a16="http://schemas.microsoft.com/office/drawing/2014/main" val="3585121254"/>
+                  </a:ext>
+                </a:extLst>
+              </a:tr>
+              <a:tr h="723254">
+                <a:tc>
+                  <a:txBody>
+                    <a:bodyPr/>
+                    <a:lstStyle/>
+                    <a:p>
+                      <a:pPr algn="just">
+                        <a:spcAft>
+                          <a:spcPts val="0"/>
+                        </a:spcAft>
+                      </a:pPr>
+                      <a:r>
+                        <a:rPr lang="en-US" sz="2400" dirty="0" err="1">
+                          <a:effectLst/>
+                        </a:rPr>
+                        <a:t>percentage_pop</a:t>
+                      </a:r>
+                      <a:endParaRPr lang="pt-PT" sz="2400" dirty="0">
+                        <a:effectLst/>
+                        <a:latin typeface="Cambria" panose="02040503050406030204" pitchFamily="18" charset="0"/>
+                        <a:ea typeface="Cambria" panose="02040503050406030204" pitchFamily="18" charset="0"/>
+                        <a:cs typeface="Times New Roman" panose="02020603050405020304" pitchFamily="18" charset="0"/>
+                      </a:endParaRPr>
+                    </a:p>
+                  </a:txBody>
+                  <a:tcPr marL="101174" marR="101174" marT="0" marB="0"/>
+                </a:tc>
+                <a:tc>
+                  <a:txBody>
+                    <a:bodyPr/>
+                    <a:lstStyle/>
+                    <a:p>
+                      <a:pPr algn="just">
+                        <a:spcAft>
+                          <a:spcPts val="0"/>
+                        </a:spcAft>
+                      </a:pPr>
+                      <a:r>
+                        <a:rPr lang="en-GB" sz="2400" dirty="0">
+                          <a:effectLst/>
+                        </a:rPr>
+                        <a:t>Quantitative</a:t>
+                      </a:r>
+                      <a:endParaRPr lang="pt-PT" sz="2400" dirty="0">
+                        <a:effectLst/>
+                        <a:latin typeface="Cambria" panose="02040503050406030204" pitchFamily="18" charset="0"/>
+                        <a:ea typeface="Cambria" panose="02040503050406030204" pitchFamily="18" charset="0"/>
+                        <a:cs typeface="Times New Roman" panose="02020603050405020304" pitchFamily="18" charset="0"/>
+                      </a:endParaRPr>
+                    </a:p>
+                  </a:txBody>
+                  <a:tcPr marL="101174" marR="101174" marT="0" marB="0"/>
+                </a:tc>
+                <a:tc>
+                  <a:txBody>
+                    <a:bodyPr/>
+                    <a:lstStyle/>
+                    <a:p>
+                      <a:pPr algn="just">
+                        <a:spcAft>
+                          <a:spcPts val="0"/>
+                        </a:spcAft>
+                      </a:pPr>
+                      <a:r>
+                        <a:rPr lang="en-GB" sz="2400" dirty="0">
+                          <a:effectLst/>
+                        </a:rPr>
+                        <a:t>Colour scale, line</a:t>
+                      </a:r>
+                      <a:endParaRPr lang="pt-PT" sz="2400" dirty="0">
+                        <a:effectLst/>
+                        <a:latin typeface="Cambria" panose="02040503050406030204" pitchFamily="18" charset="0"/>
+                        <a:ea typeface="Cambria" panose="02040503050406030204" pitchFamily="18" charset="0"/>
+                        <a:cs typeface="Times New Roman" panose="02020603050405020304" pitchFamily="18" charset="0"/>
+                      </a:endParaRPr>
+                    </a:p>
+                  </a:txBody>
+                  <a:tcPr marL="101174" marR="101174" marT="0" marB="0"/>
+                </a:tc>
+                <a:extLst>
+                  <a:ext uri="{0D108BD9-81ED-4DB2-BD59-A6C34878D82A}">
+                    <a16:rowId xmlns:a16="http://schemas.microsoft.com/office/drawing/2014/main" val="3262479487"/>
+                  </a:ext>
+                </a:extLst>
+              </a:tr>
+              <a:tr h="723254">
+                <a:tc>
+                  <a:txBody>
+                    <a:bodyPr/>
+                    <a:lstStyle/>
+                    <a:p>
+                      <a:pPr algn="just">
+                        <a:spcAft>
+                          <a:spcPts val="0"/>
+                        </a:spcAft>
+                      </a:pPr>
+                      <a:r>
+                        <a:rPr lang="en-GB" sz="2400" dirty="0">
+                          <a:effectLst/>
+                        </a:rPr>
+                        <a:t>Year</a:t>
+                      </a:r>
+                      <a:endParaRPr lang="pt-PT" sz="2400" dirty="0">
+                        <a:effectLst/>
+                        <a:latin typeface="Cambria" panose="02040503050406030204" pitchFamily="18" charset="0"/>
+                        <a:ea typeface="Cambria" panose="02040503050406030204" pitchFamily="18" charset="0"/>
+                        <a:cs typeface="Times New Roman" panose="02020603050405020304" pitchFamily="18" charset="0"/>
+                      </a:endParaRPr>
+                    </a:p>
+                  </a:txBody>
+                  <a:tcPr marL="101174" marR="101174" marT="0" marB="0"/>
+                </a:tc>
+                <a:tc>
+                  <a:txBody>
+                    <a:bodyPr/>
+                    <a:lstStyle/>
+                    <a:p>
+                      <a:pPr algn="just">
+                        <a:spcAft>
+                          <a:spcPts val="0"/>
+                        </a:spcAft>
+                      </a:pPr>
+                      <a:r>
+                        <a:rPr lang="en-GB" sz="2400">
+                          <a:effectLst/>
+                        </a:rPr>
+                        <a:t>Quantitative</a:t>
+                      </a:r>
+                      <a:endParaRPr lang="pt-PT" sz="2400">
+                        <a:effectLst/>
+                        <a:latin typeface="Cambria" panose="02040503050406030204" pitchFamily="18" charset="0"/>
+                        <a:ea typeface="Cambria" panose="02040503050406030204" pitchFamily="18" charset="0"/>
+                        <a:cs typeface="Times New Roman" panose="02020603050405020304" pitchFamily="18" charset="0"/>
+                      </a:endParaRPr>
+                    </a:p>
+                  </a:txBody>
+                  <a:tcPr marL="101174" marR="101174" marT="0" marB="0"/>
+                </a:tc>
+                <a:tc>
+                  <a:txBody>
+                    <a:bodyPr/>
+                    <a:lstStyle/>
+                    <a:p>
+                      <a:pPr algn="just">
+                        <a:spcAft>
+                          <a:spcPts val="0"/>
+                        </a:spcAft>
+                      </a:pPr>
+                      <a:r>
+                        <a:rPr lang="en-GB" sz="2400" dirty="0">
+                          <a:effectLst/>
+                        </a:rPr>
+                        <a:t>Shape, area, line</a:t>
+                      </a:r>
+                      <a:endParaRPr lang="pt-PT" sz="2400" dirty="0">
+                        <a:effectLst/>
+                        <a:latin typeface="Cambria" panose="02040503050406030204" pitchFamily="18" charset="0"/>
+                        <a:ea typeface="Cambria" panose="02040503050406030204" pitchFamily="18" charset="0"/>
+                        <a:cs typeface="Times New Roman" panose="02020603050405020304" pitchFamily="18" charset="0"/>
+                      </a:endParaRPr>
+                    </a:p>
+                  </a:txBody>
+                  <a:tcPr marL="101174" marR="101174" marT="0" marB="0"/>
+                </a:tc>
+                <a:extLst>
+                  <a:ext uri="{0D108BD9-81ED-4DB2-BD59-A6C34878D82A}">
+                    <a16:rowId xmlns:a16="http://schemas.microsoft.com/office/drawing/2014/main" val="3238000102"/>
+                  </a:ext>
+                </a:extLst>
+              </a:tr>
+              <a:tr h="653302">
+                <a:tc>
+                  <a:txBody>
+                    <a:bodyPr/>
+                    <a:lstStyle/>
+                    <a:p>
+                      <a:pPr algn="just">
+                        <a:spcAft>
+                          <a:spcPts val="0"/>
+                        </a:spcAft>
+                      </a:pPr>
+                      <a:r>
+                        <a:rPr lang="en-GB" sz="2400" dirty="0">
+                          <a:effectLst/>
+                        </a:rPr>
+                        <a:t>Country</a:t>
+                      </a:r>
+                      <a:endParaRPr lang="pt-PT" sz="2400" dirty="0">
+                        <a:effectLst/>
+                        <a:latin typeface="Cambria" panose="02040503050406030204" pitchFamily="18" charset="0"/>
+                        <a:ea typeface="Cambria" panose="02040503050406030204" pitchFamily="18" charset="0"/>
+                        <a:cs typeface="Times New Roman" panose="02020603050405020304" pitchFamily="18" charset="0"/>
+                      </a:endParaRPr>
+                    </a:p>
+                  </a:txBody>
+                  <a:tcPr marL="101174" marR="101174" marT="0" marB="0"/>
+                </a:tc>
+                <a:tc>
+                  <a:txBody>
+                    <a:bodyPr/>
+                    <a:lstStyle/>
+                    <a:p>
+                      <a:pPr algn="just">
+                        <a:spcAft>
+                          <a:spcPts val="0"/>
+                        </a:spcAft>
+                      </a:pPr>
+                      <a:r>
+                        <a:rPr lang="en-GB" sz="2400">
+                          <a:effectLst/>
+                        </a:rPr>
+                        <a:t>Nominal</a:t>
+                      </a:r>
+                      <a:endParaRPr lang="pt-PT" sz="2400">
+                        <a:effectLst/>
+                        <a:latin typeface="Cambria" panose="02040503050406030204" pitchFamily="18" charset="0"/>
+                        <a:ea typeface="Cambria" panose="02040503050406030204" pitchFamily="18" charset="0"/>
+                        <a:cs typeface="Times New Roman" panose="02020603050405020304" pitchFamily="18" charset="0"/>
+                      </a:endParaRPr>
+                    </a:p>
+                  </a:txBody>
+                  <a:tcPr marL="101174" marR="101174" marT="0" marB="0"/>
+                </a:tc>
+                <a:tc>
+                  <a:txBody>
+                    <a:bodyPr/>
+                    <a:lstStyle/>
+                    <a:p>
+                      <a:pPr algn="just">
+                        <a:spcAft>
+                          <a:spcPts val="0"/>
+                        </a:spcAft>
+                      </a:pPr>
+                      <a:r>
+                        <a:rPr lang="en-GB" sz="2400" dirty="0">
+                          <a:effectLst/>
+                        </a:rPr>
+                        <a:t>*</a:t>
+                      </a:r>
+                      <a:endParaRPr lang="pt-PT" sz="2400" dirty="0">
+                        <a:effectLst/>
+                        <a:latin typeface="Cambria" panose="02040503050406030204" pitchFamily="18" charset="0"/>
+                        <a:ea typeface="Cambria" panose="02040503050406030204" pitchFamily="18" charset="0"/>
+                        <a:cs typeface="Times New Roman" panose="02020603050405020304" pitchFamily="18" charset="0"/>
+                      </a:endParaRPr>
+                    </a:p>
+                  </a:txBody>
+                  <a:tcPr marL="101174" marR="101174" marT="0" marB="0"/>
+                </a:tc>
+                <a:extLst>
+                  <a:ext uri="{0D108BD9-81ED-4DB2-BD59-A6C34878D82A}">
+                    <a16:rowId xmlns:a16="http://schemas.microsoft.com/office/drawing/2014/main" val="4067886649"/>
+                  </a:ext>
+                </a:extLst>
+              </a:tr>
+            </a:tbl>
+          </a:graphicData>
+        </a:graphic>
+      </p:graphicFrame>
     </p:spTree>
     <p:extLst>
       <p:ext uri="{BB962C8B-B14F-4D97-AF65-F5344CB8AC3E}">
-        <p14:creationId xmlns:p14="http://schemas.microsoft.com/office/powerpoint/2010/main" val="4240120593"/>
+        <p14:creationId xmlns:p14="http://schemas.microsoft.com/office/powerpoint/2010/main" val="4281510844"/>
       </p:ext>
     </p:extLst>
   </p:cSld>
@@ -3900,12 +4561,12 @@
       </p:grpSpPr>
       <p:sp>
         <p:nvSpPr>
-          <p:cNvPr id="2" name="Title 1"/>
+          <p:cNvPr id="6" name="Text Placeholder 5"/>
           <p:cNvSpPr>
             <a:spLocks noGrp="1"/>
           </p:cNvSpPr>
           <p:nvPr>
-            <p:ph type="title"/>
+            <p:ph type="body" sz="quarter" idx="11"/>
           </p:nvPr>
         </p:nvSpPr>
         <p:spPr/>
@@ -3913,48 +4574,88 @@
           <a:bodyPr/>
           <a:lstStyle/>
           <a:p>
-            <a:r>
-              <a:rPr lang="en-US" dirty="0"/>
-              <a:t>Visual Encoding</a:t>
-            </a:r>
-            <a:endParaRPr lang="pt-PT" dirty="0"/>
-          </a:p>
-        </p:txBody>
-      </p:sp>
-      <p:sp>
-        <p:nvSpPr>
-          <p:cNvPr id="3" name="Content Placeholder 2"/>
+            <a:endParaRPr lang="en-US" dirty="0"/>
+          </a:p>
+        </p:txBody>
+      </p:sp>
+      <p:sp>
+        <p:nvSpPr>
+          <p:cNvPr id="29" name="Text Placeholder 28"/>
           <p:cNvSpPr>
             <a:spLocks noGrp="1"/>
           </p:cNvSpPr>
           <p:nvPr>
-            <p:ph idx="1"/>
+            <p:ph type="body" sz="quarter" idx="10"/>
           </p:nvPr>
         </p:nvSpPr>
         <p:spPr/>
         <p:txBody>
-          <a:bodyPr>
+          <a:bodyPr/>
+          <a:lstStyle/>
+          <a:p>
+            <a:r>
+              <a:rPr lang="pt-PT" sz="16600" dirty="0"/>
+              <a:t>03</a:t>
+            </a:r>
+          </a:p>
+        </p:txBody>
+      </p:sp>
+      <p:sp>
+        <p:nvSpPr>
+          <p:cNvPr id="4" name="Title 3"/>
+          <p:cNvSpPr>
+            <a:spLocks noGrp="1"/>
+          </p:cNvSpPr>
+          <p:nvPr>
+            <p:ph type="title"/>
+          </p:nvPr>
+        </p:nvSpPr>
+        <p:spPr>
+          <a:xfrm>
+            <a:off x="1907704" y="3214686"/>
+            <a:ext cx="7160096" cy="3033714"/>
+          </a:xfrm>
+          <a:solidFill>
+            <a:srgbClr val="FFFFFF">
+              <a:alpha val="80000"/>
+            </a:srgbClr>
+          </a:solidFill>
+        </p:spPr>
+        <p:txBody>
+          <a:bodyPr rIns="288000">
             <a:noAutofit/>
           </a:bodyPr>
           <a:lstStyle/>
           <a:p>
-            <a:r>
-              <a:rPr lang="en-US" sz="4000" dirty="0"/>
-              <a:t>Item2 | Type:</a:t>
-            </a:r>
-          </a:p>
-          <a:p>
-            <a:r>
-              <a:rPr lang="en-US" sz="4000" dirty="0"/>
-              <a:t>Visual Encoding:</a:t>
-            </a:r>
+            <a:pPr marL="0" algn="r"/>
+            <a:r>
+              <a:rPr lang="pt-PT" sz="6000" dirty="0" err="1"/>
+              <a:t>Answering</a:t>
+            </a:r>
+            <a:r>
+              <a:rPr lang="pt-PT" sz="6000" dirty="0"/>
+              <a:t> </a:t>
+            </a:r>
+            <a:r>
+              <a:rPr lang="pt-PT" sz="6000" dirty="0" err="1"/>
+              <a:t>the</a:t>
+            </a:r>
+            <a:r>
+              <a:rPr lang="pt-PT" sz="6000" dirty="0"/>
+              <a:t> </a:t>
+            </a:r>
+            <a:r>
+              <a:rPr lang="pt-PT" sz="6000" dirty="0" err="1"/>
+              <a:t>Questions</a:t>
+            </a:r>
+            <a:endParaRPr lang="pt-PT" sz="6000" dirty="0"/>
           </a:p>
         </p:txBody>
       </p:sp>
     </p:spTree>
     <p:extLst>
       <p:ext uri="{BB962C8B-B14F-4D97-AF65-F5344CB8AC3E}">
-        <p14:creationId xmlns:p14="http://schemas.microsoft.com/office/powerpoint/2010/main" val="4281510844"/>
+        <p14:creationId xmlns:p14="http://schemas.microsoft.com/office/powerpoint/2010/main" val="627357321"/>
       </p:ext>
     </p:extLst>
   </p:cSld>
@@ -3983,12 +4684,12 @@
       </p:grpSpPr>
       <p:sp>
         <p:nvSpPr>
-          <p:cNvPr id="6" name="Text Placeholder 5"/>
+          <p:cNvPr id="2" name="Title 1"/>
           <p:cNvSpPr>
             <a:spLocks noGrp="1"/>
           </p:cNvSpPr>
           <p:nvPr>
-            <p:ph type="body" sz="quarter" idx="11"/>
+            <p:ph type="title"/>
           </p:nvPr>
         </p:nvSpPr>
         <p:spPr/>
@@ -3996,88 +4697,497 @@
           <a:bodyPr/>
           <a:lstStyle/>
           <a:p>
-            <a:endParaRPr lang="en-US" dirty="0"/>
-          </a:p>
-        </p:txBody>
-      </p:sp>
-      <p:sp>
-        <p:nvSpPr>
-          <p:cNvPr id="29" name="Text Placeholder 28"/>
-          <p:cNvSpPr>
-            <a:spLocks noGrp="1"/>
-          </p:cNvSpPr>
-          <p:nvPr>
-            <p:ph type="body" sz="quarter" idx="10"/>
-          </p:nvPr>
-        </p:nvSpPr>
-        <p:spPr/>
-        <p:txBody>
-          <a:bodyPr/>
-          <a:lstStyle/>
-          <a:p>
-            <a:r>
-              <a:rPr lang="pt-PT" sz="16600" dirty="0"/>
-              <a:t>03</a:t>
-            </a:r>
-          </a:p>
-        </p:txBody>
-      </p:sp>
-      <p:sp>
-        <p:nvSpPr>
-          <p:cNvPr id="4" name="Title 3"/>
-          <p:cNvSpPr>
-            <a:spLocks noGrp="1"/>
-          </p:cNvSpPr>
-          <p:nvPr>
-            <p:ph type="title"/>
-          </p:nvPr>
-        </p:nvSpPr>
-        <p:spPr>
-          <a:xfrm>
-            <a:off x="1907704" y="3214686"/>
-            <a:ext cx="7160096" cy="3033714"/>
-          </a:xfrm>
-          <a:solidFill>
-            <a:srgbClr val="FFFFFF">
-              <a:alpha val="80000"/>
-            </a:srgbClr>
-          </a:solidFill>
-        </p:spPr>
-        <p:txBody>
-          <a:bodyPr rIns="288000">
-            <a:noAutofit/>
-          </a:bodyPr>
-          <a:lstStyle/>
-          <a:p>
-            <a:pPr marL="0" algn="r"/>
-            <a:r>
-              <a:rPr lang="pt-PT" sz="6000" dirty="0" err="1"/>
-              <a:t>Answering</a:t>
-            </a:r>
-            <a:r>
-              <a:rPr lang="pt-PT" sz="6000" dirty="0"/>
-              <a:t> </a:t>
-            </a:r>
-            <a:r>
-              <a:rPr lang="pt-PT" sz="6000" dirty="0" err="1"/>
-              <a:t>the</a:t>
-            </a:r>
-            <a:r>
-              <a:rPr lang="pt-PT" sz="6000" dirty="0"/>
-              <a:t> </a:t>
-            </a:r>
-            <a:r>
-              <a:rPr lang="pt-PT" sz="6000" dirty="0" err="1"/>
+            <a:r>
+              <a:rPr lang="en-US" dirty="0"/>
               <a:t>Questions</a:t>
             </a:r>
-            <a:endParaRPr lang="pt-PT" sz="6000" dirty="0"/>
-          </a:p>
-        </p:txBody>
-      </p:sp>
+            <a:endParaRPr lang="pt-PT" dirty="0"/>
+          </a:p>
+        </p:txBody>
+      </p:sp>
+      <p:graphicFrame>
+        <p:nvGraphicFramePr>
+          <p:cNvPr id="4" name="Marcador de Posição de Conteúdo 3">
+            <a:extLst>
+              <a:ext uri="{FF2B5EF4-FFF2-40B4-BE49-F238E27FC236}">
+                <a16:creationId xmlns:a16="http://schemas.microsoft.com/office/drawing/2014/main" id="{A18B788B-F221-DE49-8E95-27D50BA6FF3D}"/>
+              </a:ext>
+            </a:extLst>
+          </p:cNvPr>
+          <p:cNvGraphicFramePr>
+            <a:graphicFrameLocks noGrp="1"/>
+          </p:cNvGraphicFramePr>
+          <p:nvPr>
+            <p:ph idx="1"/>
+            <p:extLst>
+              <p:ext uri="{D42A27DB-BD31-4B8C-83A1-F6EECF244321}">
+                <p14:modId xmlns:p14="http://schemas.microsoft.com/office/powerpoint/2010/main" val="545729251"/>
+              </p:ext>
+            </p:extLst>
+          </p:nvPr>
+        </p:nvGraphicFramePr>
+        <p:xfrm>
+          <a:off x="212987" y="1268760"/>
+          <a:ext cx="8717993" cy="5184574"/>
+        </p:xfrm>
+        <a:graphic>
+          <a:graphicData uri="http://schemas.openxmlformats.org/drawingml/2006/table">
+            <a:tbl>
+              <a:tblPr firstRow="1" firstCol="1" bandRow="1">
+                <a:tableStyleId>{5C22544A-7EE6-4342-B048-85BDC9FD1C3A}</a:tableStyleId>
+              </a:tblPr>
+              <a:tblGrid>
+                <a:gridCol w="5175297">
+                  <a:extLst>
+                    <a:ext uri="{9D8B030D-6E8A-4147-A177-3AD203B41FA5}">
+                      <a16:colId xmlns:a16="http://schemas.microsoft.com/office/drawing/2014/main" val="3628787783"/>
+                    </a:ext>
+                  </a:extLst>
+                </a:gridCol>
+                <a:gridCol w="3542696">
+                  <a:extLst>
+                    <a:ext uri="{9D8B030D-6E8A-4147-A177-3AD203B41FA5}">
+                      <a16:colId xmlns:a16="http://schemas.microsoft.com/office/drawing/2014/main" val="2589494068"/>
+                    </a:ext>
+                  </a:extLst>
+                </a:gridCol>
+              </a:tblGrid>
+              <a:tr h="509958">
+                <a:tc>
+                  <a:txBody>
+                    <a:bodyPr/>
+                    <a:lstStyle/>
+                    <a:p>
+                      <a:pPr>
+                        <a:spcBef>
+                          <a:spcPts val="75"/>
+                        </a:spcBef>
+                        <a:spcAft>
+                          <a:spcPts val="60"/>
+                        </a:spcAft>
+                      </a:pPr>
+                      <a:r>
+                        <a:rPr lang="en-GB" sz="1800" dirty="0">
+                          <a:effectLst/>
+                        </a:rPr>
+                        <a:t>Questions</a:t>
+                      </a:r>
+                      <a:endParaRPr lang="pt-PT" sz="1800" dirty="0">
+                        <a:effectLst/>
+                        <a:latin typeface="Cambria" panose="02040503050406030204" pitchFamily="18" charset="0"/>
+                        <a:ea typeface="Cambria" panose="02040503050406030204" pitchFamily="18" charset="0"/>
+                        <a:cs typeface="Times New Roman" panose="02020603050405020304" pitchFamily="18" charset="0"/>
+                      </a:endParaRPr>
+                    </a:p>
+                  </a:txBody>
+                  <a:tcPr marL="88474" marR="88474" marT="0" marB="0"/>
+                </a:tc>
+                <a:tc>
+                  <a:txBody>
+                    <a:bodyPr/>
+                    <a:lstStyle/>
+                    <a:p>
+                      <a:pPr>
+                        <a:spcBef>
+                          <a:spcPts val="75"/>
+                        </a:spcBef>
+                        <a:spcAft>
+                          <a:spcPts val="60"/>
+                        </a:spcAft>
+                      </a:pPr>
+                      <a:r>
+                        <a:rPr lang="en-GB" sz="1800" dirty="0">
+                          <a:effectLst/>
+                        </a:rPr>
+                        <a:t>Encoding</a:t>
+                      </a:r>
+                      <a:endParaRPr lang="pt-PT" sz="1800" dirty="0">
+                        <a:effectLst/>
+                        <a:latin typeface="Cambria" panose="02040503050406030204" pitchFamily="18" charset="0"/>
+                        <a:ea typeface="Cambria" panose="02040503050406030204" pitchFamily="18" charset="0"/>
+                        <a:cs typeface="Times New Roman" panose="02020603050405020304" pitchFamily="18" charset="0"/>
+                      </a:endParaRPr>
+                    </a:p>
+                  </a:txBody>
+                  <a:tcPr marL="88474" marR="88474" marT="0" marB="0"/>
+                </a:tc>
+                <a:extLst>
+                  <a:ext uri="{0D108BD9-81ED-4DB2-BD59-A6C34878D82A}">
+                    <a16:rowId xmlns:a16="http://schemas.microsoft.com/office/drawing/2014/main" val="1284484207"/>
+                  </a:ext>
+                </a:extLst>
+              </a:tr>
+              <a:tr h="1572371">
+                <a:tc>
+                  <a:txBody>
+                    <a:bodyPr/>
+                    <a:lstStyle/>
+                    <a:p>
+                      <a:pPr>
+                        <a:spcBef>
+                          <a:spcPts val="75"/>
+                        </a:spcBef>
+                        <a:spcAft>
+                          <a:spcPts val="60"/>
+                        </a:spcAft>
+                      </a:pPr>
+                      <a:r>
+                        <a:rPr lang="en-GB" sz="1800" dirty="0">
+                          <a:effectLst/>
+                        </a:rPr>
+                        <a:t>How many hours in average do the countries in Eu spend in reading</a:t>
+                      </a:r>
+                      <a:endParaRPr lang="pt-PT" sz="1800" dirty="0">
+                        <a:effectLst/>
+                        <a:latin typeface="Cambria" panose="02040503050406030204" pitchFamily="18" charset="0"/>
+                        <a:ea typeface="Cambria" panose="02040503050406030204" pitchFamily="18" charset="0"/>
+                        <a:cs typeface="Times New Roman" panose="02020603050405020304" pitchFamily="18" charset="0"/>
+                      </a:endParaRPr>
+                    </a:p>
+                  </a:txBody>
+                  <a:tcPr marL="88474" marR="88474" marT="0" marB="0"/>
+                </a:tc>
+                <a:tc>
+                  <a:txBody>
+                    <a:bodyPr/>
+                    <a:lstStyle/>
+                    <a:p>
+                      <a:pPr>
+                        <a:spcBef>
+                          <a:spcPts val="75"/>
+                        </a:spcBef>
+                        <a:spcAft>
+                          <a:spcPts val="60"/>
+                        </a:spcAft>
+                      </a:pPr>
+                      <a:r>
+                        <a:rPr lang="en-GB" sz="1800" dirty="0">
+                          <a:effectLst/>
+                        </a:rPr>
+                        <a:t>Countries: Map with EU countries</a:t>
+                      </a:r>
+                      <a:endParaRPr lang="pt-PT" sz="1800" dirty="0">
+                        <a:effectLst/>
+                      </a:endParaRPr>
+                    </a:p>
+                    <a:p>
+                      <a:pPr>
+                        <a:spcBef>
+                          <a:spcPts val="75"/>
+                        </a:spcBef>
+                        <a:spcAft>
+                          <a:spcPts val="60"/>
+                        </a:spcAft>
+                      </a:pPr>
+                      <a:r>
+                        <a:rPr lang="en-GB" sz="1800" dirty="0">
+                          <a:effectLst/>
+                        </a:rPr>
+                        <a:t>Average time: colour scale (for each country)</a:t>
+                      </a:r>
+                      <a:endParaRPr lang="pt-PT" sz="1800" dirty="0">
+                        <a:effectLst/>
+                        <a:latin typeface="Cambria" panose="02040503050406030204" pitchFamily="18" charset="0"/>
+                        <a:ea typeface="Cambria" panose="02040503050406030204" pitchFamily="18" charset="0"/>
+                        <a:cs typeface="Times New Roman" panose="02020603050405020304" pitchFamily="18" charset="0"/>
+                      </a:endParaRPr>
+                    </a:p>
+                  </a:txBody>
+                  <a:tcPr marL="88474" marR="88474" marT="0" marB="0"/>
+                </a:tc>
+                <a:extLst>
+                  <a:ext uri="{0D108BD9-81ED-4DB2-BD59-A6C34878D82A}">
+                    <a16:rowId xmlns:a16="http://schemas.microsoft.com/office/drawing/2014/main" val="1174184092"/>
+                  </a:ext>
+                </a:extLst>
+              </a:tr>
+              <a:tr h="1572371">
+                <a:tc>
+                  <a:txBody>
+                    <a:bodyPr/>
+                    <a:lstStyle/>
+                    <a:p>
+                      <a:pPr>
+                        <a:spcBef>
+                          <a:spcPts val="75"/>
+                        </a:spcBef>
+                        <a:spcAft>
+                          <a:spcPts val="60"/>
+                        </a:spcAft>
+                      </a:pPr>
+                      <a:r>
+                        <a:rPr lang="en-GB" sz="1800">
+                          <a:effectLst/>
+                        </a:rPr>
+                        <a:t>Average income for education for level</a:t>
+                      </a:r>
+                      <a:endParaRPr lang="pt-PT" sz="1800">
+                        <a:effectLst/>
+                        <a:latin typeface="Cambria" panose="02040503050406030204" pitchFamily="18" charset="0"/>
+                        <a:ea typeface="Cambria" panose="02040503050406030204" pitchFamily="18" charset="0"/>
+                        <a:cs typeface="Times New Roman" panose="02020603050405020304" pitchFamily="18" charset="0"/>
+                      </a:endParaRPr>
+                    </a:p>
+                  </a:txBody>
+                  <a:tcPr marL="88474" marR="88474" marT="0" marB="0"/>
+                </a:tc>
+                <a:tc>
+                  <a:txBody>
+                    <a:bodyPr/>
+                    <a:lstStyle/>
+                    <a:p>
+                      <a:pPr>
+                        <a:spcBef>
+                          <a:spcPts val="75"/>
+                        </a:spcBef>
+                        <a:spcAft>
+                          <a:spcPts val="60"/>
+                        </a:spcAft>
+                      </a:pPr>
+                      <a:r>
+                        <a:rPr lang="en-GB" sz="1800" dirty="0">
+                          <a:effectLst/>
+                        </a:rPr>
+                        <a:t>Education level:  Heatmap + scatter plot </a:t>
+                      </a:r>
+                      <a:endParaRPr lang="pt-PT" sz="1800" dirty="0">
+                        <a:effectLst/>
+                      </a:endParaRPr>
+                    </a:p>
+                    <a:p>
+                      <a:pPr>
+                        <a:spcBef>
+                          <a:spcPts val="75"/>
+                        </a:spcBef>
+                        <a:spcAft>
+                          <a:spcPts val="60"/>
+                        </a:spcAft>
+                      </a:pPr>
+                      <a:r>
+                        <a:rPr lang="en-GB" sz="1800" dirty="0">
+                          <a:effectLst/>
+                        </a:rPr>
+                        <a:t>Average Income: colour scale</a:t>
+                      </a:r>
+                      <a:endParaRPr lang="pt-PT" sz="1800" dirty="0">
+                        <a:effectLst/>
+                        <a:latin typeface="Cambria" panose="02040503050406030204" pitchFamily="18" charset="0"/>
+                        <a:ea typeface="Cambria" panose="02040503050406030204" pitchFamily="18" charset="0"/>
+                        <a:cs typeface="Times New Roman" panose="02020603050405020304" pitchFamily="18" charset="0"/>
+                      </a:endParaRPr>
+                    </a:p>
+                  </a:txBody>
+                  <a:tcPr marL="88474" marR="88474" marT="0" marB="0"/>
+                </a:tc>
+                <a:extLst>
+                  <a:ext uri="{0D108BD9-81ED-4DB2-BD59-A6C34878D82A}">
+                    <a16:rowId xmlns:a16="http://schemas.microsoft.com/office/drawing/2014/main" val="2850774241"/>
+                  </a:ext>
+                </a:extLst>
+              </a:tr>
+              <a:tr h="509958">
+                <a:tc>
+                  <a:txBody>
+                    <a:bodyPr/>
+                    <a:lstStyle/>
+                    <a:p>
+                      <a:pPr>
+                        <a:spcBef>
+                          <a:spcPts val="75"/>
+                        </a:spcBef>
+                        <a:spcAft>
+                          <a:spcPts val="60"/>
+                        </a:spcAft>
+                      </a:pPr>
+                      <a:r>
+                        <a:rPr lang="en-GB" sz="1800">
+                          <a:effectLst/>
+                        </a:rPr>
+                        <a:t>Country reading habit and dropout rate</a:t>
+                      </a:r>
+                      <a:endParaRPr lang="pt-PT" sz="1800">
+                        <a:effectLst/>
+                        <a:latin typeface="Cambria" panose="02040503050406030204" pitchFamily="18" charset="0"/>
+                        <a:ea typeface="Cambria" panose="02040503050406030204" pitchFamily="18" charset="0"/>
+                        <a:cs typeface="Times New Roman" panose="02020603050405020304" pitchFamily="18" charset="0"/>
+                      </a:endParaRPr>
+                    </a:p>
+                  </a:txBody>
+                  <a:tcPr marL="88474" marR="88474" marT="0" marB="0"/>
+                </a:tc>
+                <a:tc>
+                  <a:txBody>
+                    <a:bodyPr/>
+                    <a:lstStyle/>
+                    <a:p>
+                      <a:pPr>
+                        <a:spcBef>
+                          <a:spcPts val="75"/>
+                        </a:spcBef>
+                        <a:spcAft>
+                          <a:spcPts val="60"/>
+                        </a:spcAft>
+                      </a:pPr>
+                      <a:r>
+                        <a:rPr lang="en-GB" sz="1800" dirty="0">
+                          <a:effectLst/>
+                        </a:rPr>
+                        <a:t>Parallel Coordinates plot</a:t>
+                      </a:r>
+                      <a:endParaRPr lang="pt-PT" sz="1800" dirty="0">
+                        <a:effectLst/>
+                        <a:latin typeface="Cambria" panose="02040503050406030204" pitchFamily="18" charset="0"/>
+                        <a:ea typeface="Cambria" panose="02040503050406030204" pitchFamily="18" charset="0"/>
+                        <a:cs typeface="Times New Roman" panose="02020603050405020304" pitchFamily="18" charset="0"/>
+                      </a:endParaRPr>
+                    </a:p>
+                  </a:txBody>
+                  <a:tcPr marL="88474" marR="88474" marT="0" marB="0"/>
+                </a:tc>
+                <a:extLst>
+                  <a:ext uri="{0D108BD9-81ED-4DB2-BD59-A6C34878D82A}">
+                    <a16:rowId xmlns:a16="http://schemas.microsoft.com/office/drawing/2014/main" val="81549720"/>
+                  </a:ext>
+                </a:extLst>
+              </a:tr>
+              <a:tr h="509958">
+                <a:tc>
+                  <a:txBody>
+                    <a:bodyPr/>
+                    <a:lstStyle/>
+                    <a:p>
+                      <a:pPr>
+                        <a:spcBef>
+                          <a:spcPts val="75"/>
+                        </a:spcBef>
+                        <a:spcAft>
+                          <a:spcPts val="60"/>
+                        </a:spcAft>
+                      </a:pPr>
+                      <a:r>
+                        <a:rPr lang="en-GB" sz="1800">
+                          <a:effectLst/>
+                        </a:rPr>
+                        <a:t>Education participation </a:t>
+                      </a:r>
+                      <a:endParaRPr lang="pt-PT" sz="1800">
+                        <a:effectLst/>
+                        <a:latin typeface="Cambria" panose="02040503050406030204" pitchFamily="18" charset="0"/>
+                        <a:ea typeface="Cambria" panose="02040503050406030204" pitchFamily="18" charset="0"/>
+                        <a:cs typeface="Times New Roman" panose="02020603050405020304" pitchFamily="18" charset="0"/>
+                      </a:endParaRPr>
+                    </a:p>
+                  </a:txBody>
+                  <a:tcPr marL="88474" marR="88474" marT="0" marB="0"/>
+                </a:tc>
+                <a:tc>
+                  <a:txBody>
+                    <a:bodyPr/>
+                    <a:lstStyle/>
+                    <a:p>
+                      <a:pPr>
+                        <a:spcBef>
+                          <a:spcPts val="75"/>
+                        </a:spcBef>
+                        <a:spcAft>
+                          <a:spcPts val="60"/>
+                        </a:spcAft>
+                      </a:pPr>
+                      <a:r>
+                        <a:rPr lang="en-GB" sz="1800" dirty="0">
+                          <a:effectLst/>
+                        </a:rPr>
+                        <a:t>Parallel Coordinates plot</a:t>
+                      </a:r>
+                      <a:endParaRPr lang="pt-PT" sz="1800" dirty="0">
+                        <a:effectLst/>
+                        <a:latin typeface="Cambria" panose="02040503050406030204" pitchFamily="18" charset="0"/>
+                        <a:ea typeface="Cambria" panose="02040503050406030204" pitchFamily="18" charset="0"/>
+                        <a:cs typeface="Times New Roman" panose="02020603050405020304" pitchFamily="18" charset="0"/>
+                      </a:endParaRPr>
+                    </a:p>
+                  </a:txBody>
+                  <a:tcPr marL="88474" marR="88474" marT="0" marB="0"/>
+                </a:tc>
+                <a:extLst>
+                  <a:ext uri="{0D108BD9-81ED-4DB2-BD59-A6C34878D82A}">
+                    <a16:rowId xmlns:a16="http://schemas.microsoft.com/office/drawing/2014/main" val="1200175667"/>
+                  </a:ext>
+                </a:extLst>
+              </a:tr>
+              <a:tr h="509958">
+                <a:tc>
+                  <a:txBody>
+                    <a:bodyPr/>
+                    <a:lstStyle/>
+                    <a:p>
+                      <a:pPr>
+                        <a:spcBef>
+                          <a:spcPts val="75"/>
+                        </a:spcBef>
+                        <a:spcAft>
+                          <a:spcPts val="60"/>
+                        </a:spcAft>
+                      </a:pPr>
+                      <a:r>
+                        <a:rPr lang="en-GB" sz="1800">
+                          <a:effectLst/>
+                        </a:rPr>
+                        <a:t>Household expenditure in books</a:t>
+                      </a:r>
+                      <a:endParaRPr lang="pt-PT" sz="1800">
+                        <a:effectLst/>
+                        <a:latin typeface="Cambria" panose="02040503050406030204" pitchFamily="18" charset="0"/>
+                        <a:ea typeface="Cambria" panose="02040503050406030204" pitchFamily="18" charset="0"/>
+                        <a:cs typeface="Times New Roman" panose="02020603050405020304" pitchFamily="18" charset="0"/>
+                      </a:endParaRPr>
+                    </a:p>
+                  </a:txBody>
+                  <a:tcPr marL="88474" marR="88474" marT="0" marB="0"/>
+                </a:tc>
+                <a:tc>
+                  <a:txBody>
+                    <a:bodyPr/>
+                    <a:lstStyle/>
+                    <a:p>
+                      <a:pPr>
+                        <a:spcBef>
+                          <a:spcPts val="75"/>
+                        </a:spcBef>
+                        <a:spcAft>
+                          <a:spcPts val="60"/>
+                        </a:spcAft>
+                      </a:pPr>
+                      <a:r>
+                        <a:rPr lang="en-GB" sz="1800" dirty="0">
+                          <a:effectLst/>
+                        </a:rPr>
+                        <a:t>Parallel Coordinates plot</a:t>
+                      </a:r>
+                      <a:endParaRPr lang="pt-PT" sz="1800" dirty="0">
+                        <a:effectLst/>
+                        <a:latin typeface="Cambria" panose="02040503050406030204" pitchFamily="18" charset="0"/>
+                        <a:ea typeface="Cambria" panose="02040503050406030204" pitchFamily="18" charset="0"/>
+                        <a:cs typeface="Times New Roman" panose="02020603050405020304" pitchFamily="18" charset="0"/>
+                      </a:endParaRPr>
+                    </a:p>
+                  </a:txBody>
+                  <a:tcPr marL="88474" marR="88474" marT="0" marB="0"/>
+                </a:tc>
+                <a:extLst>
+                  <a:ext uri="{0D108BD9-81ED-4DB2-BD59-A6C34878D82A}">
+                    <a16:rowId xmlns:a16="http://schemas.microsoft.com/office/drawing/2014/main" val="3719888603"/>
+                  </a:ext>
+                </a:extLst>
+              </a:tr>
+            </a:tbl>
+          </a:graphicData>
+        </a:graphic>
+      </p:graphicFrame>
     </p:spTree>
     <p:extLst>
       <p:ext uri="{BB962C8B-B14F-4D97-AF65-F5344CB8AC3E}">
-        <p14:creationId xmlns:p14="http://schemas.microsoft.com/office/powerpoint/2010/main" val="627357321"/>
+        <p14:creationId xmlns:p14="http://schemas.microsoft.com/office/powerpoint/2010/main" val="2962997025"/>
       </p:ext>
     </p:extLst>
   </p:cSld>
@@ -4121,7 +5231,7 @@
           <a:p>
             <a:r>
               <a:rPr lang="en-US" dirty="0"/>
-              <a:t>Question &lt;n&gt;</a:t>
+              <a:t>Question &lt;2&gt; Story Board</a:t>
             </a:r>
             <a:endParaRPr lang="pt-PT" dirty="0"/>
           </a:p>
@@ -4129,159 +5239,327 @@
       </p:sp>
       <p:sp>
         <p:nvSpPr>
-          <p:cNvPr id="3" name="Content Placeholder 2"/>
-          <p:cNvSpPr>
-            <a:spLocks noGrp="1"/>
-          </p:cNvSpPr>
-          <p:nvPr>
-            <p:ph idx="1"/>
-          </p:nvPr>
+          <p:cNvPr id="6" name="Retângulo 5">
+            <a:extLst>
+              <a:ext uri="{FF2B5EF4-FFF2-40B4-BE49-F238E27FC236}">
+                <a16:creationId xmlns:a16="http://schemas.microsoft.com/office/drawing/2014/main" id="{676BD649-ADBB-1F4C-9489-A68AB92DDF8A}"/>
+              </a:ext>
+            </a:extLst>
+          </p:cNvPr>
+          <p:cNvSpPr/>
+          <p:nvPr/>
         </p:nvSpPr>
         <p:spPr>
           <a:xfrm>
-            <a:off x="457200" y="1285860"/>
-            <a:ext cx="8435280" cy="5214974"/>
+            <a:off x="107503" y="1543494"/>
+            <a:ext cx="3973436" cy="4108817"/>
           </a:xfrm>
+          <a:prstGeom prst="rect">
+            <a:avLst/>
+          </a:prstGeom>
         </p:spPr>
         <p:txBody>
-          <a:bodyPr>
-            <a:noAutofit/>
+          <a:bodyPr wrap="square">
+            <a:spAutoFit/>
           </a:bodyPr>
           <a:lstStyle/>
           <a:p>
-            <a:r>
-              <a:rPr lang="en-US" dirty="0"/>
-              <a:t>&lt;Question&gt;</a:t>
-            </a:r>
-          </a:p>
-          <a:p>
-            <a:r>
-              <a:rPr lang="en-US" dirty="0"/>
-              <a:t>(Visual) explanation of how the vis allows us to answer it</a:t>
-            </a:r>
-          </a:p>
-          <a:p>
-            <a:r>
-              <a:rPr lang="en-US" dirty="0"/>
-              <a:t>For at least one of the questions: storyboard depicting the use of several idioms in tandem.</a:t>
-            </a:r>
-          </a:p>
-          <a:p>
-            <a:pPr lvl="1"/>
-            <a:endParaRPr lang="en-US" sz="2000" dirty="0"/>
-          </a:p>
-        </p:txBody>
-      </p:sp>
+            <a:pPr>
+              <a:spcBef>
+                <a:spcPts val="1200"/>
+              </a:spcBef>
+              <a:spcAft>
+                <a:spcPts val="600"/>
+              </a:spcAft>
+            </a:pPr>
+            <a:r>
+              <a:rPr lang="en-GB" b="1" dirty="0">
+                <a:latin typeface="Calibri" panose="020F0502020204030204" pitchFamily="34" charset="0"/>
+                <a:ea typeface="DejaVu Sans Condensed"/>
+                <a:cs typeface="DejaVu Sans Condensed"/>
+              </a:rPr>
+              <a:t>Story board:  Average income for education level?								</a:t>
+            </a:r>
+          </a:p>
+          <a:p>
+            <a:pPr marL="285750" indent="-285750">
+              <a:spcBef>
+                <a:spcPts val="1200"/>
+              </a:spcBef>
+              <a:spcAft>
+                <a:spcPts val="600"/>
+              </a:spcAft>
+              <a:buFont typeface="Arial" panose="020B0604020202020204" pitchFamily="34" charset="0"/>
+              <a:buChar char="•"/>
+            </a:pPr>
+            <a:r>
+              <a:rPr lang="en-GB" sz="1600" b="1" dirty="0">
+                <a:latin typeface="Calibri" panose="020F0502020204030204" pitchFamily="34" charset="0"/>
+                <a:ea typeface="Cambria" panose="02040503050406030204" pitchFamily="18" charset="0"/>
+                <a:cs typeface="Times New Roman" panose="02020603050405020304" pitchFamily="18" charset="0"/>
+              </a:rPr>
+              <a:t>3 Heatmaps </a:t>
+            </a:r>
+            <a:r>
+              <a:rPr lang="pt-PT" sz="1600" b="1" dirty="0">
+                <a:ea typeface="Cambria" panose="02040503050406030204" pitchFamily="18" charset="0"/>
+                <a:cs typeface="Times New Roman" panose="02020603050405020304" pitchFamily="18" charset="0"/>
+              </a:rPr>
+              <a:t>(for </a:t>
+            </a:r>
+            <a:r>
+              <a:rPr lang="pt-PT" sz="1600" b="1" dirty="0" err="1">
+                <a:ea typeface="Cambria" panose="02040503050406030204" pitchFamily="18" charset="0"/>
+                <a:cs typeface="Times New Roman" panose="02020603050405020304" pitchFamily="18" charset="0"/>
+              </a:rPr>
+              <a:t>each</a:t>
+            </a:r>
+            <a:r>
+              <a:rPr lang="pt-PT" sz="1600" b="1" dirty="0">
+                <a:ea typeface="Cambria" panose="02040503050406030204" pitchFamily="18" charset="0"/>
+                <a:cs typeface="Times New Roman" panose="02020603050405020304" pitchFamily="18" charset="0"/>
+              </a:rPr>
+              <a:t> </a:t>
+            </a:r>
+            <a:r>
+              <a:rPr lang="pt-PT" sz="1600" b="1" dirty="0" err="1">
+                <a:ea typeface="Cambria" panose="02040503050406030204" pitchFamily="18" charset="0"/>
+                <a:cs typeface="Times New Roman" panose="02020603050405020304" pitchFamily="18" charset="0"/>
+              </a:rPr>
+              <a:t>education</a:t>
+            </a:r>
+            <a:r>
+              <a:rPr lang="pt-PT" sz="1600" b="1" dirty="0">
+                <a:ea typeface="Cambria" panose="02040503050406030204" pitchFamily="18" charset="0"/>
+                <a:cs typeface="Times New Roman" panose="02020603050405020304" pitchFamily="18" charset="0"/>
+              </a:rPr>
+              <a:t> </a:t>
+            </a:r>
+            <a:r>
+              <a:rPr lang="pt-PT" sz="1600" b="1" dirty="0" err="1">
+                <a:ea typeface="Cambria" panose="02040503050406030204" pitchFamily="18" charset="0"/>
+                <a:cs typeface="Times New Roman" panose="02020603050405020304" pitchFamily="18" charset="0"/>
+              </a:rPr>
+              <a:t>level</a:t>
+            </a:r>
+            <a:r>
+              <a:rPr lang="pt-PT" sz="1600" b="1" dirty="0">
+                <a:ea typeface="Cambria" panose="02040503050406030204" pitchFamily="18" charset="0"/>
+                <a:cs typeface="Times New Roman" panose="02020603050405020304" pitchFamily="18" charset="0"/>
+              </a:rPr>
+              <a:t>)</a:t>
+            </a:r>
+          </a:p>
+          <a:p>
+            <a:pPr marL="285750" indent="-285750">
+              <a:spcBef>
+                <a:spcPts val="1200"/>
+              </a:spcBef>
+              <a:spcAft>
+                <a:spcPts val="600"/>
+              </a:spcAft>
+              <a:buFont typeface="Arial" panose="020B0604020202020204" pitchFamily="34" charset="0"/>
+              <a:buChar char="•"/>
+            </a:pPr>
+            <a:r>
+              <a:rPr lang="pt-PT" sz="1600" b="1" dirty="0">
+                <a:ea typeface="Cambria" panose="02040503050406030204" pitchFamily="18" charset="0"/>
+                <a:cs typeface="Times New Roman" panose="02020603050405020304" pitchFamily="18" charset="0"/>
+              </a:rPr>
+              <a:t>Incoming </a:t>
+            </a:r>
+            <a:r>
+              <a:rPr lang="pt-PT" sz="1600" b="1" dirty="0" err="1">
+                <a:ea typeface="Cambria" panose="02040503050406030204" pitchFamily="18" charset="0"/>
+                <a:cs typeface="Times New Roman" panose="02020603050405020304" pitchFamily="18" charset="0"/>
+              </a:rPr>
+              <a:t>Level</a:t>
+            </a:r>
+            <a:r>
+              <a:rPr lang="pt-PT" sz="1600" b="1" dirty="0">
+                <a:ea typeface="Cambria" panose="02040503050406030204" pitchFamily="18" charset="0"/>
+                <a:cs typeface="Times New Roman" panose="02020603050405020304" pitchFamily="18" charset="0"/>
+              </a:rPr>
+              <a:t> (color </a:t>
+            </a:r>
+            <a:r>
+              <a:rPr lang="pt-PT" sz="1600" b="1" dirty="0" err="1">
+                <a:ea typeface="Cambria" panose="02040503050406030204" pitchFamily="18" charset="0"/>
+                <a:cs typeface="Times New Roman" panose="02020603050405020304" pitchFamily="18" charset="0"/>
+              </a:rPr>
+              <a:t>scale</a:t>
+            </a:r>
+            <a:r>
+              <a:rPr lang="pt-PT" sz="1600" b="1" dirty="0">
+                <a:ea typeface="Cambria" panose="02040503050406030204" pitchFamily="18" charset="0"/>
+                <a:cs typeface="Times New Roman" panose="02020603050405020304" pitchFamily="18" charset="0"/>
+              </a:rPr>
+              <a:t>)</a:t>
+            </a:r>
+          </a:p>
+          <a:p>
+            <a:pPr marL="285750" indent="-285750">
+              <a:spcBef>
+                <a:spcPts val="1200"/>
+              </a:spcBef>
+              <a:spcAft>
+                <a:spcPts val="600"/>
+              </a:spcAft>
+              <a:buFont typeface="Arial" panose="020B0604020202020204" pitchFamily="34" charset="0"/>
+              <a:buChar char="•"/>
+            </a:pPr>
+            <a:r>
+              <a:rPr lang="pt-PT" sz="1600" b="1" dirty="0" err="1">
+                <a:ea typeface="Cambria" panose="02040503050406030204" pitchFamily="18" charset="0"/>
+                <a:cs typeface="Times New Roman" panose="02020603050405020304" pitchFamily="18" charset="0"/>
+              </a:rPr>
+              <a:t>Scatter</a:t>
+            </a:r>
+            <a:r>
+              <a:rPr lang="pt-PT" sz="1600" b="1" dirty="0">
+                <a:ea typeface="Cambria" panose="02040503050406030204" pitchFamily="18" charset="0"/>
+                <a:cs typeface="Times New Roman" panose="02020603050405020304" pitchFamily="18" charset="0"/>
+              </a:rPr>
+              <a:t> </a:t>
+            </a:r>
+            <a:r>
+              <a:rPr lang="pt-PT" sz="1600" b="1" dirty="0" err="1">
+                <a:ea typeface="Cambria" panose="02040503050406030204" pitchFamily="18" charset="0"/>
+                <a:cs typeface="Times New Roman" panose="02020603050405020304" pitchFamily="18" charset="0"/>
+              </a:rPr>
+              <a:t>plot</a:t>
+            </a:r>
+            <a:r>
+              <a:rPr lang="pt-PT" sz="1600" b="1" dirty="0">
+                <a:ea typeface="Cambria" panose="02040503050406030204" pitchFamily="18" charset="0"/>
+                <a:cs typeface="Times New Roman" panose="02020603050405020304" pitchFamily="18" charset="0"/>
+              </a:rPr>
+              <a:t> (</a:t>
+            </a:r>
+            <a:r>
+              <a:rPr lang="pt-PT" sz="1600" b="1" dirty="0" err="1">
+                <a:ea typeface="Cambria" panose="02040503050406030204" pitchFamily="18" charset="0"/>
+                <a:cs typeface="Times New Roman" panose="02020603050405020304" pitchFamily="18" charset="0"/>
+              </a:rPr>
+              <a:t>Evolution</a:t>
+            </a:r>
+            <a:r>
+              <a:rPr lang="pt-PT" sz="1600" b="1" dirty="0">
+                <a:ea typeface="Cambria" panose="02040503050406030204" pitchFamily="18" charset="0"/>
+                <a:cs typeface="Times New Roman" panose="02020603050405020304" pitchFamily="18" charset="0"/>
+              </a:rPr>
+              <a:t> </a:t>
+            </a:r>
+            <a:r>
+              <a:rPr lang="pt-PT" sz="1600" b="1" dirty="0" err="1">
+                <a:ea typeface="Cambria" panose="02040503050406030204" pitchFamily="18" charset="0"/>
+                <a:cs typeface="Times New Roman" panose="02020603050405020304" pitchFamily="18" charset="0"/>
+              </a:rPr>
+              <a:t>each</a:t>
+            </a:r>
+            <a:r>
+              <a:rPr lang="pt-PT" sz="1600" b="1" dirty="0">
+                <a:ea typeface="Cambria" panose="02040503050406030204" pitchFamily="18" charset="0"/>
+                <a:cs typeface="Times New Roman" panose="02020603050405020304" pitchFamily="18" charset="0"/>
+              </a:rPr>
+              <a:t> </a:t>
+            </a:r>
+            <a:r>
+              <a:rPr lang="pt-PT" sz="1600" b="1" dirty="0" err="1">
+                <a:ea typeface="Cambria" panose="02040503050406030204" pitchFamily="18" charset="0"/>
+                <a:cs typeface="Times New Roman" panose="02020603050405020304" pitchFamily="18" charset="0"/>
+              </a:rPr>
+              <a:t>level</a:t>
+            </a:r>
+            <a:r>
+              <a:rPr lang="pt-PT" sz="1600" b="1" dirty="0">
+                <a:ea typeface="Cambria" panose="02040503050406030204" pitchFamily="18" charset="0"/>
+                <a:cs typeface="Times New Roman" panose="02020603050405020304" pitchFamily="18" charset="0"/>
+              </a:rPr>
+              <a:t> </a:t>
+            </a:r>
+            <a:r>
+              <a:rPr lang="pt-PT" sz="1600" b="1" dirty="0" err="1">
+                <a:ea typeface="Cambria" panose="02040503050406030204" pitchFamily="18" charset="0"/>
+                <a:cs typeface="Times New Roman" panose="02020603050405020304" pitchFamily="18" charset="0"/>
+              </a:rPr>
+              <a:t>of</a:t>
+            </a:r>
+            <a:r>
+              <a:rPr lang="pt-PT" sz="1600" b="1" dirty="0">
+                <a:ea typeface="Cambria" panose="02040503050406030204" pitchFamily="18" charset="0"/>
+                <a:cs typeface="Times New Roman" panose="02020603050405020304" pitchFamily="18" charset="0"/>
+              </a:rPr>
+              <a:t> </a:t>
+            </a:r>
+            <a:r>
+              <a:rPr lang="pt-PT" sz="1600" b="1" dirty="0" err="1">
+                <a:ea typeface="Cambria" panose="02040503050406030204" pitchFamily="18" charset="0"/>
+                <a:cs typeface="Times New Roman" panose="02020603050405020304" pitchFamily="18" charset="0"/>
+              </a:rPr>
+              <a:t>education</a:t>
+            </a:r>
+            <a:r>
+              <a:rPr lang="pt-PT" sz="1600" b="1" dirty="0">
+                <a:ea typeface="Cambria" panose="02040503050406030204" pitchFamily="18" charset="0"/>
+                <a:cs typeface="Times New Roman" panose="02020603050405020304" pitchFamily="18" charset="0"/>
+              </a:rPr>
+              <a:t>)																				</a:t>
+            </a:r>
+            <a:endParaRPr lang="en-GB" sz="1600" b="1" dirty="0">
+              <a:ea typeface="Cambria" panose="02040503050406030204" pitchFamily="18" charset="0"/>
+              <a:cs typeface="Times New Roman" panose="02020603050405020304" pitchFamily="18" charset="0"/>
+            </a:endParaRPr>
+          </a:p>
+        </p:txBody>
+      </p:sp>
+      <p:pic>
+        <p:nvPicPr>
+          <p:cNvPr id="7" name="Marcador de Posição de Conteúdo 6">
+            <a:extLst>
+              <a:ext uri="{FF2B5EF4-FFF2-40B4-BE49-F238E27FC236}">
+                <a16:creationId xmlns:a16="http://schemas.microsoft.com/office/drawing/2014/main" id="{F4C05129-7730-0349-BC3E-CA33DA862EB2}"/>
+              </a:ext>
+            </a:extLst>
+          </p:cNvPr>
+          <p:cNvPicPr>
+            <a:picLocks noGrp="1"/>
+          </p:cNvPicPr>
+          <p:nvPr>
+            <p:ph idx="1"/>
+          </p:nvPr>
+        </p:nvPicPr>
+        <p:blipFill>
+          <a:blip r:embed="rId3">
+            <a:extLst>
+              <a:ext uri="{28A0092B-C50C-407E-A947-70E740481C1C}">
+                <a14:useLocalDpi xmlns:a14="http://schemas.microsoft.com/office/drawing/2010/main" val="0"/>
+              </a:ext>
+            </a:extLst>
+          </a:blip>
+          <a:srcRect/>
+          <a:stretch>
+            <a:fillRect/>
+          </a:stretch>
+        </p:blipFill>
+        <p:spPr bwMode="auto">
+          <a:xfrm>
+            <a:off x="4080939" y="1556792"/>
+            <a:ext cx="4955557" cy="3456384"/>
+          </a:xfrm>
+          <a:prstGeom prst="rect">
+            <a:avLst/>
+          </a:prstGeom>
+          <a:noFill/>
+          <a:ln>
+            <a:noFill/>
+          </a:ln>
+        </p:spPr>
+      </p:pic>
     </p:spTree>
     <p:extLst>
       <p:ext uri="{BB962C8B-B14F-4D97-AF65-F5344CB8AC3E}">
-        <p14:creationId xmlns:p14="http://schemas.microsoft.com/office/powerpoint/2010/main" val="2962997025"/>
-      </p:ext>
-    </p:extLst>
-  </p:cSld>
-  <p:clrMapOvr>
-    <a:masterClrMapping/>
-  </p:clrMapOvr>
-</p:sld>
-</file>
-
-<file path=ppt/slides/slide9.xml><?xml version="1.0" encoding="utf-8"?>
-<p:sld xmlns:a="http://schemas.openxmlformats.org/drawingml/2006/main" xmlns:r="http://schemas.openxmlformats.org/officeDocument/2006/relationships" xmlns:p="http://schemas.openxmlformats.org/presentationml/2006/main">
-  <p:cSld>
-    <p:spTree>
-      <p:nvGrpSpPr>
-        <p:cNvPr id="1" name=""/>
-        <p:cNvGrpSpPr/>
-        <p:nvPr/>
-      </p:nvGrpSpPr>
-      <p:grpSpPr>
-        <a:xfrm>
-          <a:off x="0" y="0"/>
-          <a:ext cx="0" cy="0"/>
-          <a:chOff x="0" y="0"/>
-          <a:chExt cx="0" cy="0"/>
-        </a:xfrm>
-      </p:grpSpPr>
-      <p:sp>
-        <p:nvSpPr>
-          <p:cNvPr id="2" name="Título 1">
-            <a:extLst>
-              <a:ext uri="{FF2B5EF4-FFF2-40B4-BE49-F238E27FC236}">
-                <a16:creationId xmlns:a16="http://schemas.microsoft.com/office/drawing/2014/main" id="{61F9DD7F-DCCE-4138-B400-BBC6D27D083C}"/>
-              </a:ext>
-            </a:extLst>
-          </p:cNvPr>
-          <p:cNvSpPr>
-            <a:spLocks noGrp="1"/>
-          </p:cNvSpPr>
-          <p:nvPr>
-            <p:ph type="title"/>
-          </p:nvPr>
-        </p:nvSpPr>
-        <p:spPr/>
-        <p:txBody>
-          <a:bodyPr/>
-          <a:lstStyle/>
-          <a:p>
-            <a:r>
-              <a:rPr lang="pt-PT" dirty="0" err="1"/>
-              <a:t>The</a:t>
-            </a:r>
-            <a:r>
-              <a:rPr lang="pt-PT" dirty="0"/>
-              <a:t> </a:t>
-            </a:r>
-            <a:r>
-              <a:rPr lang="pt-PT" dirty="0" err="1"/>
-              <a:t>End</a:t>
-            </a:r>
-            <a:endParaRPr lang="pt-PT" dirty="0"/>
-          </a:p>
-        </p:txBody>
-      </p:sp>
-      <p:sp>
-        <p:nvSpPr>
-          <p:cNvPr id="3" name="Marcador de Posição de Conteúdo 2">
-            <a:extLst>
-              <a:ext uri="{FF2B5EF4-FFF2-40B4-BE49-F238E27FC236}">
-                <a16:creationId xmlns:a16="http://schemas.microsoft.com/office/drawing/2014/main" id="{F3E5A466-089C-496E-8C4D-F2D1CEB83F9A}"/>
-              </a:ext>
-            </a:extLst>
-          </p:cNvPr>
-          <p:cNvSpPr>
-            <a:spLocks noGrp="1"/>
-          </p:cNvSpPr>
-          <p:nvPr>
-            <p:ph idx="1"/>
-          </p:nvPr>
-        </p:nvSpPr>
-        <p:spPr>
-          <a:xfrm>
-            <a:off x="1835696" y="2780928"/>
-            <a:ext cx="8229600" cy="5214974"/>
-          </a:xfrm>
-        </p:spPr>
-        <p:txBody>
-          <a:bodyPr>
-            <a:normAutofit/>
-          </a:bodyPr>
-          <a:lstStyle/>
-          <a:p>
-            <a:r>
-              <a:rPr lang="pt-PT" sz="8800" dirty="0" err="1"/>
-              <a:t>Questions</a:t>
-            </a:r>
-            <a:r>
-              <a:rPr lang="pt-PT" sz="8800" dirty="0"/>
-              <a:t>?</a:t>
-            </a:r>
-          </a:p>
-        </p:txBody>
-      </p:sp>
-    </p:spTree>
-    <p:extLst>
-      <p:ext uri="{BB962C8B-B14F-4D97-AF65-F5344CB8AC3E}">
-        <p14:creationId xmlns:p14="http://schemas.microsoft.com/office/powerpoint/2010/main" val="2429260091"/>
+        <p14:creationId xmlns:p14="http://schemas.microsoft.com/office/powerpoint/2010/main" val="3099294060"/>
       </p:ext>
     </p:extLst>
   </p:cSld>

</xml_diff>

<commit_message>
final versions before feedback
</commit_message>
<xml_diff>
--- a/CheckpointIII/CIII_G15.pptx
+++ b/CheckpointIII/CIII_G15.pptx
@@ -218,7 +218,7 @@
           <a:p>
             <a:fld id="{745C36E7-9E00-462E-80A3-32F2BE615C7A}" type="datetimeFigureOut">
               <a:rPr lang="en-US" smtClean="0"/>
-              <a:t>10/29/19</a:t>
+              <a:t>04-Nov-19</a:t>
             </a:fld>
             <a:endParaRPr lang="en-US"/>
           </a:p>
@@ -384,7 +384,7 @@
             <a:fld id="{01F3E309-ED8D-4193-99AF-E5EA90965E98}" type="datetimeFigureOut">
               <a:rPr lang="en-US" smtClean="0"/>
               <a:pPr/>
-              <a:t>10/29/19</a:t>
+              <a:t>04-Nov-19</a:t>
             </a:fld>
             <a:endParaRPr lang="en-US"/>
           </a:p>
@@ -1486,7 +1486,7 @@
             <a:fld id="{F3CC9924-33BC-4796-B0F9-D37DB5D899BF}" type="datetimeFigureOut">
               <a:rPr lang="pt-PT" smtClean="0"/>
               <a:pPr/>
-              <a:t>29/10/19</a:t>
+              <a:t>04/11/2019</a:t>
             </a:fld>
             <a:endParaRPr lang="pt-PT"/>
           </a:p>
@@ -3263,14 +3263,20 @@
                   <a:schemeClr val="bg2"/>
                 </a:solidFill>
               </a:rPr>
-              <a:t>GX-A/T</a:t>
-            </a:r>
-          </a:p>
-        </p:txBody>
-      </p:sp>
-      <p:sp>
-        <p:nvSpPr>
-          <p:cNvPr id="8" name="Text Placeholder 4"/>
+              <a:t>G15-A</a:t>
+            </a:r>
+          </a:p>
+        </p:txBody>
+      </p:sp>
+      <p:sp>
+        <p:nvSpPr>
+          <p:cNvPr id="6" name="Text Placeholder 4">
+            <a:extLst>
+              <a:ext uri="{FF2B5EF4-FFF2-40B4-BE49-F238E27FC236}">
+                <a16:creationId xmlns:a16="http://schemas.microsoft.com/office/drawing/2014/main" id="{40EFE924-4CD3-4DE9-A296-DB6283A834FA}"/>
+              </a:ext>
+            </a:extLst>
+          </p:cNvPr>
           <p:cNvSpPr txBox="1">
             <a:spLocks/>
           </p:cNvSpPr>
@@ -3279,14 +3285,12 @@
         <p:spPr>
           <a:xfrm>
             <a:off x="1979712" y="4571984"/>
-            <a:ext cx="2285984" cy="2286016"/>
+            <a:ext cx="3528392" cy="2286016"/>
           </a:xfrm>
           <a:prstGeom prst="rect">
             <a:avLst/>
           </a:prstGeom>
-          <a:solidFill>
-            <a:schemeClr val="bg1"/>
-          </a:solidFill>
+          <a:noFill/>
           <a:ln>
             <a:noFill/>
           </a:ln>
@@ -3433,13 +3437,44 @@
             </a:lvl9pPr>
           </a:lstStyle>
           <a:p>
+            <a:pPr algn="l"/>
+            <a:r>
+              <a:rPr lang="pt-PT" sz="2400" b="0" dirty="0">
+                <a:solidFill>
+                  <a:schemeClr val="bg2"/>
+                </a:solidFill>
+              </a:rPr>
+              <a:t>88647 – Yasser  Zacarias</a:t>
+            </a:r>
+          </a:p>
+          <a:p>
+            <a:pPr algn="l"/>
+            <a:r>
+              <a:rPr lang="pt-PT" sz="2400" b="0" dirty="0">
+                <a:solidFill>
+                  <a:schemeClr val="bg2"/>
+                </a:solidFill>
+              </a:rPr>
+              <a:t>86473 – Margarida Morais</a:t>
+            </a:r>
+          </a:p>
+          <a:p>
+            <a:pPr algn="l"/>
+            <a:r>
+              <a:rPr lang="pt-PT" sz="2400" b="0" dirty="0">
+                <a:solidFill>
+                  <a:schemeClr val="bg2"/>
+                </a:solidFill>
+              </a:rPr>
+              <a:t>79457 – Maxwell </a:t>
+            </a:r>
             <a:r>
               <a:rPr lang="pt-PT" sz="2400" b="0" dirty="0" err="1">
                 <a:solidFill>
                   <a:schemeClr val="bg2"/>
                 </a:solidFill>
               </a:rPr>
-              <a:t>Number</a:t>
+              <a:t>Junior</a:t>
             </a:r>
             <a:r>
               <a:rPr lang="pt-PT" sz="2400" b="0" dirty="0">
@@ -3447,83 +3482,8 @@
                   <a:schemeClr val="bg2"/>
                 </a:solidFill>
               </a:rPr>
-              <a:t> – </a:t>
-            </a:r>
-            <a:r>
-              <a:rPr lang="pt-PT" sz="2400" b="0" dirty="0" err="1">
-                <a:solidFill>
-                  <a:schemeClr val="bg2"/>
-                </a:solidFill>
-              </a:rPr>
-              <a:t>Name</a:t>
-            </a:r>
-            <a:endParaRPr lang="pt-PT" sz="2400" b="0" dirty="0">
-              <a:solidFill>
-                <a:schemeClr val="bg2"/>
-              </a:solidFill>
-            </a:endParaRPr>
-          </a:p>
-          <a:p>
-            <a:r>
-              <a:rPr lang="pt-PT" sz="2400" b="0" dirty="0" err="1">
-                <a:solidFill>
-                  <a:schemeClr val="bg2"/>
-                </a:solidFill>
-              </a:rPr>
-              <a:t>Number</a:t>
-            </a:r>
-            <a:r>
-              <a:rPr lang="pt-PT" sz="2400" b="0" dirty="0">
-                <a:solidFill>
-                  <a:schemeClr val="bg2"/>
-                </a:solidFill>
-              </a:rPr>
-              <a:t> – </a:t>
-            </a:r>
-            <a:r>
-              <a:rPr lang="pt-PT" sz="2400" b="0" dirty="0" err="1">
-                <a:solidFill>
-                  <a:schemeClr val="bg2"/>
-                </a:solidFill>
-              </a:rPr>
-              <a:t>Name</a:t>
-            </a:r>
-            <a:endParaRPr lang="pt-PT" sz="2400" b="0" dirty="0">
-              <a:solidFill>
-                <a:schemeClr val="bg2"/>
-              </a:solidFill>
-            </a:endParaRPr>
-          </a:p>
-          <a:p>
-            <a:r>
-              <a:rPr lang="pt-PT" sz="2400" b="0" dirty="0" err="1">
-                <a:solidFill>
-                  <a:schemeClr val="bg2"/>
-                </a:solidFill>
-              </a:rPr>
-              <a:t>Number</a:t>
-            </a:r>
-            <a:r>
-              <a:rPr lang="pt-PT" sz="2400" b="0" dirty="0">
-                <a:solidFill>
-                  <a:schemeClr val="bg2"/>
-                </a:solidFill>
-              </a:rPr>
-              <a:t> – </a:t>
-            </a:r>
-            <a:r>
-              <a:rPr lang="pt-PT" sz="2400" b="0" dirty="0" err="1">
-                <a:solidFill>
-                  <a:schemeClr val="bg2"/>
-                </a:solidFill>
-              </a:rPr>
-              <a:t>Name</a:t>
-            </a:r>
-            <a:endParaRPr lang="pt-PT" sz="2400" b="0" dirty="0">
-              <a:solidFill>
-                <a:schemeClr val="bg2"/>
-              </a:solidFill>
-            </a:endParaRPr>
+              <a:t> </a:t>
+            </a:r>
           </a:p>
         </p:txBody>
       </p:sp>

</xml_diff>